<commit_message>
Little Rock Tech Fest 2019
</commit_message>
<xml_diff>
--- a/Authorization-IdentityServer4v2.pptx
+++ b/Authorization-IdentityServer4v2.pptx
@@ -5,35 +5,36 @@
     <p:sldMasterId id="2147483648" r:id="rId4"/>
   </p:sldMasterIdLst>
   <p:notesMasterIdLst>
-    <p:notesMasterId r:id="rId28"/>
+    <p:notesMasterId r:id="rId29"/>
   </p:notesMasterIdLst>
   <p:handoutMasterIdLst>
-    <p:handoutMasterId r:id="rId29"/>
+    <p:handoutMasterId r:id="rId30"/>
   </p:handoutMasterIdLst>
   <p:sldIdLst>
     <p:sldId id="276" r:id="rId5"/>
-    <p:sldId id="265" r:id="rId6"/>
-    <p:sldId id="266" r:id="rId7"/>
-    <p:sldId id="277" r:id="rId8"/>
-    <p:sldId id="267" r:id="rId9"/>
-    <p:sldId id="269" r:id="rId10"/>
-    <p:sldId id="274" r:id="rId11"/>
-    <p:sldId id="288" r:id="rId12"/>
-    <p:sldId id="289" r:id="rId13"/>
-    <p:sldId id="281" r:id="rId14"/>
-    <p:sldId id="270" r:id="rId15"/>
-    <p:sldId id="282" r:id="rId16"/>
-    <p:sldId id="273" r:id="rId17"/>
-    <p:sldId id="287" r:id="rId18"/>
-    <p:sldId id="272" r:id="rId19"/>
-    <p:sldId id="285" r:id="rId20"/>
+    <p:sldId id="266" r:id="rId6"/>
+    <p:sldId id="277" r:id="rId7"/>
+    <p:sldId id="271" r:id="rId8"/>
+    <p:sldId id="286" r:id="rId9"/>
+    <p:sldId id="267" r:id="rId10"/>
+    <p:sldId id="269" r:id="rId11"/>
+    <p:sldId id="274" r:id="rId12"/>
+    <p:sldId id="288" r:id="rId13"/>
+    <p:sldId id="291" r:id="rId14"/>
+    <p:sldId id="289" r:id="rId15"/>
+    <p:sldId id="281" r:id="rId16"/>
+    <p:sldId id="270" r:id="rId17"/>
+    <p:sldId id="282" r:id="rId18"/>
+    <p:sldId id="273" r:id="rId19"/>
+    <p:sldId id="287" r:id="rId20"/>
     <p:sldId id="290" r:id="rId21"/>
-    <p:sldId id="271" r:id="rId22"/>
-    <p:sldId id="286" r:id="rId23"/>
-    <p:sldId id="283" r:id="rId24"/>
+    <p:sldId id="272" r:id="rId22"/>
+    <p:sldId id="283" r:id="rId23"/>
+    <p:sldId id="285" r:id="rId24"/>
     <p:sldId id="284" r:id="rId25"/>
     <p:sldId id="279" r:id="rId26"/>
     <p:sldId id="278" r:id="rId27"/>
+    <p:sldId id="265" r:id="rId28"/>
   </p:sldIdLst>
   <p:sldSz cx="12192000" cy="6858000"/>
   <p:notesSz cx="6858000" cy="9144000"/>
@@ -138,13 +139,15 @@
         <p14:section name="Default Section" id="{34486516-DA5E-445B-AC17-C0448449C9A1}">
           <p14:sldIdLst>
             <p14:sldId id="276"/>
-            <p14:sldId id="265"/>
             <p14:sldId id="266"/>
             <p14:sldId id="277"/>
+            <p14:sldId id="271"/>
+            <p14:sldId id="286"/>
             <p14:sldId id="267"/>
             <p14:sldId id="269"/>
             <p14:sldId id="274"/>
             <p14:sldId id="288"/>
+            <p14:sldId id="291"/>
             <p14:sldId id="289"/>
             <p14:sldId id="281"/>
             <p14:sldId id="270"/>
@@ -155,15 +158,14 @@
           <p14:sldIdLst>
             <p14:sldId id="273"/>
             <p14:sldId id="287"/>
+            <p14:sldId id="290"/>
             <p14:sldId id="272"/>
+            <p14:sldId id="283"/>
             <p14:sldId id="285"/>
-            <p14:sldId id="290"/>
-            <p14:sldId id="271"/>
-            <p14:sldId id="286"/>
-            <p14:sldId id="283"/>
             <p14:sldId id="284"/>
             <p14:sldId id="279"/>
             <p14:sldId id="278"/>
+            <p14:sldId id="265"/>
           </p14:sldIdLst>
         </p14:section>
       </p14:sectionLst>
@@ -187,10 +189,6 @@
     </p:ext>
   </p:extLst>
 </p:presentation>
-</file>
-
-<file path=ppt/revisionInfo.xml><?xml version="1.0" encoding="utf-8"?>
-<p1510:revInfo xmlns:a="http://schemas.openxmlformats.org/drawingml/2006/main" xmlns:r="http://schemas.openxmlformats.org/officeDocument/2006/relationships" xmlns:p1510="http://schemas.microsoft.com/office/powerpoint/2015/10/main"/>
 </file>
 
 <file path=ppt/diagrams/colors1.xml><?xml version="1.0" encoding="utf-8"?>
@@ -16871,7 +16869,7 @@
           <a:p>
             <a:fld id="{762B48F5-BACC-47D6-A0F7-82FBF9C6BC85}" type="datetimeFigureOut">
               <a:rPr lang="en-US"/>
-              <a:t>6/13/2018</a:t>
+              <a:t>10/11/2019</a:t>
             </a:fld>
             <a:endParaRPr/>
           </a:p>
@@ -17036,7 +17034,7 @@
           <a:p>
             <a:fld id="{0CB1CD00-5424-4675-AB18-2C419B060449}" type="datetimeFigureOut">
               <a:rPr lang="en-US"/>
-              <a:t>6/13/2018</a:t>
+              <a:t>10/11/2019</a:t>
             </a:fld>
             <a:endParaRPr/>
           </a:p>
@@ -17426,7 +17424,168 @@
           <a:bodyPr/>
           <a:lstStyle/>
           <a:p>
-            <a:endParaRPr lang="en-US"/>
+            <a:r>
+              <a:rPr lang="en-US" sz="1200" b="0" i="0" kern="1200" dirty="0">
+                <a:solidFill>
+                  <a:schemeClr val="tx1"/>
+                </a:solidFill>
+                <a:effectLst/>
+                <a:latin typeface="+mn-lt"/>
+                <a:ea typeface="+mn-ea"/>
+                <a:cs typeface="+mn-cs"/>
+              </a:rPr>
+              <a:t>Access tokens can come in two </a:t>
+            </a:r>
+            <a:r>
+              <a:rPr lang="en-US" sz="1200" b="0" i="0" kern="1200" dirty="0" err="1">
+                <a:solidFill>
+                  <a:schemeClr val="tx1"/>
+                </a:solidFill>
+                <a:effectLst/>
+                <a:latin typeface="+mn-lt"/>
+                <a:ea typeface="+mn-ea"/>
+                <a:cs typeface="+mn-cs"/>
+              </a:rPr>
+              <a:t>flavours</a:t>
+            </a:r>
+            <a:r>
+              <a:rPr lang="en-US" sz="1200" b="0" i="0" kern="1200" dirty="0">
+                <a:solidFill>
+                  <a:schemeClr val="tx1"/>
+                </a:solidFill>
+                <a:effectLst/>
+                <a:latin typeface="+mn-lt"/>
+                <a:ea typeface="+mn-ea"/>
+                <a:cs typeface="+mn-cs"/>
+              </a:rPr>
+              <a:t> - self-contained or reference.</a:t>
+            </a:r>
+          </a:p>
+          <a:p>
+            <a:endParaRPr lang="en-US" sz="1200" b="0" i="0" kern="1200" dirty="0">
+              <a:solidFill>
+                <a:schemeClr val="tx1"/>
+              </a:solidFill>
+              <a:effectLst/>
+              <a:latin typeface="+mn-lt"/>
+              <a:ea typeface="+mn-ea"/>
+              <a:cs typeface="+mn-cs"/>
+            </a:endParaRPr>
+          </a:p>
+          <a:p>
+            <a:r>
+              <a:rPr lang="en-US" sz="1200" b="0" i="0" kern="1200" dirty="0">
+                <a:solidFill>
+                  <a:schemeClr val="tx1"/>
+                </a:solidFill>
+                <a:effectLst/>
+                <a:latin typeface="+mn-lt"/>
+                <a:ea typeface="+mn-ea"/>
+                <a:cs typeface="+mn-cs"/>
+              </a:rPr>
+              <a:t> JWTs hard to revoke. They will stay valid until they expire.</a:t>
+            </a:r>
+          </a:p>
+          <a:p>
+            <a:endParaRPr lang="en-US" sz="1200" b="0" i="0" kern="1200" dirty="0">
+              <a:solidFill>
+                <a:schemeClr val="tx1"/>
+              </a:solidFill>
+              <a:effectLst/>
+              <a:latin typeface="+mn-lt"/>
+              <a:ea typeface="+mn-ea"/>
+              <a:cs typeface="+mn-cs"/>
+            </a:endParaRPr>
+          </a:p>
+          <a:p>
+            <a:r>
+              <a:rPr lang="en-US" sz="1200" b="0" i="0" kern="1200" dirty="0">
+                <a:solidFill>
+                  <a:schemeClr val="tx1"/>
+                </a:solidFill>
+                <a:effectLst/>
+                <a:latin typeface="+mn-lt"/>
+                <a:ea typeface="+mn-ea"/>
+                <a:cs typeface="+mn-cs"/>
+              </a:rPr>
+              <a:t>reference tokens is that you have much more control over their lifetime. </a:t>
+            </a:r>
+          </a:p>
+          <a:p>
+            <a:r>
+              <a:rPr lang="en-US" sz="1200" b="0" i="0" kern="1200" dirty="0">
+                <a:solidFill>
+                  <a:schemeClr val="tx1"/>
+                </a:solidFill>
+                <a:effectLst/>
+                <a:latin typeface="+mn-lt"/>
+                <a:ea typeface="+mn-ea"/>
+                <a:cs typeface="+mn-cs"/>
+              </a:rPr>
+              <a:t>recipient then needs to open a back-channel to the token service, send the token to a validation endpoint, and if valid, retrieves the contents as the response.</a:t>
+            </a:r>
+          </a:p>
+          <a:p>
+            <a:endParaRPr lang="en-US" sz="1200" b="0" i="0" kern="1200" dirty="0">
+              <a:solidFill>
+                <a:schemeClr val="tx1"/>
+              </a:solidFill>
+              <a:effectLst/>
+              <a:latin typeface="+mn-lt"/>
+              <a:ea typeface="+mn-ea"/>
+              <a:cs typeface="+mn-cs"/>
+            </a:endParaRPr>
+          </a:p>
+          <a:p>
+            <a:r>
+              <a:rPr lang="en-US" sz="1200" b="0" i="0" kern="1200" dirty="0" err="1">
+                <a:solidFill>
+                  <a:schemeClr val="tx1"/>
+                </a:solidFill>
+                <a:effectLst/>
+                <a:latin typeface="+mn-lt"/>
+                <a:ea typeface="+mn-ea"/>
+                <a:cs typeface="+mn-cs"/>
+              </a:rPr>
+              <a:t>IdentityServer</a:t>
+            </a:r>
+            <a:r>
+              <a:rPr lang="en-US" sz="1200" b="0" i="0" kern="1200" dirty="0">
+                <a:solidFill>
+                  <a:schemeClr val="tx1"/>
+                </a:solidFill>
+                <a:effectLst/>
+                <a:latin typeface="+mn-lt"/>
+                <a:ea typeface="+mn-ea"/>
+                <a:cs typeface="+mn-cs"/>
+              </a:rPr>
+              <a:t> will store the contents of the token in a data store and will only issue a unique identifier for this token back to the client. The API receiving this reference must then open a back-channel communication to </a:t>
+            </a:r>
+            <a:r>
+              <a:rPr lang="en-US" sz="1200" b="0" i="0" kern="1200" dirty="0" err="1">
+                <a:solidFill>
+                  <a:schemeClr val="tx1"/>
+                </a:solidFill>
+                <a:effectLst/>
+                <a:latin typeface="+mn-lt"/>
+                <a:ea typeface="+mn-ea"/>
+                <a:cs typeface="+mn-cs"/>
+              </a:rPr>
+              <a:t>IdentityServer</a:t>
+            </a:r>
+            <a:r>
+              <a:rPr lang="en-US" sz="1200" b="0" i="0" kern="1200" dirty="0">
+                <a:solidFill>
+                  <a:schemeClr val="tx1"/>
+                </a:solidFill>
+                <a:effectLst/>
+                <a:latin typeface="+mn-lt"/>
+                <a:ea typeface="+mn-ea"/>
+                <a:cs typeface="+mn-cs"/>
+              </a:rPr>
+              <a:t> to validate the token.</a:t>
+            </a:r>
+            <a:endParaRPr lang="en-US" dirty="0"/>
           </a:p>
         </p:txBody>
       </p:sp>
@@ -17456,6 +17615,189 @@
     </p:spTree>
     <p:extLst>
       <p:ext uri="{BB962C8B-B14F-4D97-AF65-F5344CB8AC3E}">
+        <p14:creationId xmlns:p14="http://schemas.microsoft.com/office/powerpoint/2010/main" val="4033790077"/>
+      </p:ext>
+    </p:extLst>
+  </p:cSld>
+  <p:clrMapOvr>
+    <a:masterClrMapping/>
+  </p:clrMapOvr>
+</p:notes>
+</file>
+
+<file path=ppt/notesSlides/notesSlide11.xml><?xml version="1.0" encoding="utf-8"?>
+<p:notes xmlns:a="http://schemas.openxmlformats.org/drawingml/2006/main" xmlns:r="http://schemas.openxmlformats.org/officeDocument/2006/relationships" xmlns:p="http://schemas.openxmlformats.org/presentationml/2006/main">
+  <p:cSld>
+    <p:spTree>
+      <p:nvGrpSpPr>
+        <p:cNvPr id="1" name=""/>
+        <p:cNvGrpSpPr/>
+        <p:nvPr/>
+      </p:nvGrpSpPr>
+      <p:grpSpPr>
+        <a:xfrm>
+          <a:off x="0" y="0"/>
+          <a:ext cx="0" cy="0"/>
+          <a:chOff x="0" y="0"/>
+          <a:chExt cx="0" cy="0"/>
+        </a:xfrm>
+      </p:grpSpPr>
+      <p:sp>
+        <p:nvSpPr>
+          <p:cNvPr id="2" name="Slide Image Placeholder 1"/>
+          <p:cNvSpPr>
+            <a:spLocks noGrp="1" noRot="1" noChangeAspect="1"/>
+          </p:cNvSpPr>
+          <p:nvPr>
+            <p:ph type="sldImg"/>
+          </p:nvPr>
+        </p:nvSpPr>
+        <p:spPr/>
+      </p:sp>
+      <p:sp>
+        <p:nvSpPr>
+          <p:cNvPr id="3" name="Notes Placeholder 2"/>
+          <p:cNvSpPr>
+            <a:spLocks noGrp="1"/>
+          </p:cNvSpPr>
+          <p:nvPr>
+            <p:ph type="body" idx="1"/>
+          </p:nvPr>
+        </p:nvSpPr>
+        <p:spPr/>
+        <p:txBody>
+          <a:bodyPr/>
+          <a:lstStyle/>
+          <a:p>
+            <a:r>
+              <a:rPr lang="en-US" sz="1200" b="0" i="0" kern="1200" dirty="0">
+                <a:solidFill>
+                  <a:schemeClr val="tx1"/>
+                </a:solidFill>
+                <a:effectLst/>
+                <a:latin typeface="+mn-lt"/>
+                <a:ea typeface="+mn-ea"/>
+                <a:cs typeface="+mn-cs"/>
+              </a:rPr>
+              <a:t>“grant type” refers to the way an application gets an access token</a:t>
+            </a:r>
+            <a:endParaRPr lang="en-US" dirty="0"/>
+          </a:p>
+        </p:txBody>
+      </p:sp>
+      <p:sp>
+        <p:nvSpPr>
+          <p:cNvPr id="4" name="Slide Number Placeholder 3"/>
+          <p:cNvSpPr>
+            <a:spLocks noGrp="1"/>
+          </p:cNvSpPr>
+          <p:nvPr>
+            <p:ph type="sldNum" sz="quarter" idx="10"/>
+          </p:nvPr>
+        </p:nvSpPr>
+        <p:spPr/>
+        <p:txBody>
+          <a:bodyPr/>
+          <a:lstStyle/>
+          <a:p>
+            <a:fld id="{5EE2CF44-2B13-41B4-A334-1CDF534EEBBF}" type="slidenum">
+              <a:rPr lang="en-US" smtClean="0"/>
+              <a:t>12</a:t>
+            </a:fld>
+            <a:endParaRPr lang="en-US"/>
+          </a:p>
+        </p:txBody>
+      </p:sp>
+    </p:spTree>
+    <p:extLst>
+      <p:ext uri="{BB962C8B-B14F-4D97-AF65-F5344CB8AC3E}">
+        <p14:creationId xmlns:p14="http://schemas.microsoft.com/office/powerpoint/2010/main" val="2984286313"/>
+      </p:ext>
+    </p:extLst>
+  </p:cSld>
+  <p:clrMapOvr>
+    <a:masterClrMapping/>
+  </p:clrMapOvr>
+</p:notes>
+</file>
+
+<file path=ppt/notesSlides/notesSlide12.xml><?xml version="1.0" encoding="utf-8"?>
+<p:notes xmlns:a="http://schemas.openxmlformats.org/drawingml/2006/main" xmlns:r="http://schemas.openxmlformats.org/officeDocument/2006/relationships" xmlns:p="http://schemas.openxmlformats.org/presentationml/2006/main">
+  <p:cSld>
+    <p:spTree>
+      <p:nvGrpSpPr>
+        <p:cNvPr id="1" name=""/>
+        <p:cNvGrpSpPr/>
+        <p:nvPr/>
+      </p:nvGrpSpPr>
+      <p:grpSpPr>
+        <a:xfrm>
+          <a:off x="0" y="0"/>
+          <a:ext cx="0" cy="0"/>
+          <a:chOff x="0" y="0"/>
+          <a:chExt cx="0" cy="0"/>
+        </a:xfrm>
+      </p:grpSpPr>
+      <p:sp>
+        <p:nvSpPr>
+          <p:cNvPr id="2" name="Slide Image Placeholder 1"/>
+          <p:cNvSpPr>
+            <a:spLocks noGrp="1" noRot="1" noChangeAspect="1"/>
+          </p:cNvSpPr>
+          <p:nvPr>
+            <p:ph type="sldImg"/>
+          </p:nvPr>
+        </p:nvSpPr>
+        <p:spPr/>
+      </p:sp>
+      <p:sp>
+        <p:nvSpPr>
+          <p:cNvPr id="3" name="Notes Placeholder 2"/>
+          <p:cNvSpPr>
+            <a:spLocks noGrp="1"/>
+          </p:cNvSpPr>
+          <p:nvPr>
+            <p:ph type="body" idx="1"/>
+          </p:nvPr>
+        </p:nvSpPr>
+        <p:spPr/>
+        <p:txBody>
+          <a:bodyPr/>
+          <a:lstStyle/>
+          <a:p>
+            <a:r>
+              <a:rPr lang="en-US" dirty="0"/>
+              <a:t>D:\IdentityServer4-master\IdentityServer4-master\samples\Quickstarts\2_ResourceOwnerPasswords</a:t>
+            </a:r>
+          </a:p>
+        </p:txBody>
+      </p:sp>
+      <p:sp>
+        <p:nvSpPr>
+          <p:cNvPr id="4" name="Slide Number Placeholder 3"/>
+          <p:cNvSpPr>
+            <a:spLocks noGrp="1"/>
+          </p:cNvSpPr>
+          <p:nvPr>
+            <p:ph type="sldNum" sz="quarter" idx="10"/>
+          </p:nvPr>
+        </p:nvSpPr>
+        <p:spPr/>
+        <p:txBody>
+          <a:bodyPr/>
+          <a:lstStyle/>
+          <a:p>
+            <a:fld id="{5EE2CF44-2B13-41B4-A334-1CDF534EEBBF}" type="slidenum">
+              <a:rPr lang="en-US" smtClean="0"/>
+              <a:t>13</a:t>
+            </a:fld>
+            <a:endParaRPr lang="en-US"/>
+          </a:p>
+        </p:txBody>
+      </p:sp>
+    </p:spTree>
+    <p:extLst>
+      <p:ext uri="{BB962C8B-B14F-4D97-AF65-F5344CB8AC3E}">
         <p14:creationId xmlns:p14="http://schemas.microsoft.com/office/powerpoint/2010/main" val="1979703093"/>
       </p:ext>
     </p:extLst>
@@ -17466,7 +17808,7 @@
 </p:notes>
 </file>
 
-<file path=ppt/notesSlides/notesSlide11.xml><?xml version="1.0" encoding="utf-8"?>
+<file path=ppt/notesSlides/notesSlide13.xml><?xml version="1.0" encoding="utf-8"?>
 <p:notes xmlns:a="http://schemas.openxmlformats.org/drawingml/2006/main" xmlns:r="http://schemas.openxmlformats.org/officeDocument/2006/relationships" xmlns:p="http://schemas.openxmlformats.org/presentationml/2006/main">
   <p:cSld>
     <p:spTree>
@@ -17543,7 +17885,7 @@
           <a:p>
             <a:fld id="{5EE2CF44-2B13-41B4-A334-1CDF534EEBBF}" type="slidenum">
               <a:rPr lang="en-US" smtClean="0"/>
-              <a:t>12</a:t>
+              <a:t>14</a:t>
             </a:fld>
             <a:endParaRPr lang="en-US"/>
           </a:p>
@@ -17562,7 +17904,7 @@
 </p:notes>
 </file>
 
-<file path=ppt/notesSlides/notesSlide12.xml><?xml version="1.0" encoding="utf-8"?>
+<file path=ppt/notesSlides/notesSlide14.xml><?xml version="1.0" encoding="utf-8"?>
 <p:notes xmlns:a="http://schemas.openxmlformats.org/drawingml/2006/main" xmlns:r="http://schemas.openxmlformats.org/officeDocument/2006/relationships" xmlns:p="http://schemas.openxmlformats.org/presentationml/2006/main">
   <p:cSld>
     <p:spTree>
@@ -17645,6 +17987,48 @@
               <a:rPr lang="en-US" dirty="0"/>
               <a:t> client is not authorized/ID Token must be validated</a:t>
             </a:r>
+          </a:p>
+          <a:p>
+            <a:endParaRPr lang="en-US" dirty="0"/>
+          </a:p>
+          <a:p>
+            <a:r>
+              <a:rPr lang="en-US" sz="1200" b="0" i="0" kern="1200" dirty="0">
+                <a:solidFill>
+                  <a:schemeClr val="tx1"/>
+                </a:solidFill>
+                <a:effectLst/>
+                <a:latin typeface="+mn-lt"/>
+                <a:ea typeface="+mn-ea"/>
+                <a:cs typeface="+mn-cs"/>
+              </a:rPr>
+              <a:t>authorization code with PKCE now replaces OpenID </a:t>
+            </a:r>
+            <a:r>
+              <a:rPr lang="en-US" sz="1200" b="0" i="0" kern="1200" dirty="0" err="1">
+                <a:solidFill>
+                  <a:schemeClr val="tx1"/>
+                </a:solidFill>
+                <a:effectLst/>
+                <a:latin typeface="+mn-lt"/>
+                <a:ea typeface="+mn-ea"/>
+                <a:cs typeface="+mn-cs"/>
+              </a:rPr>
+              <a:t>Connect's</a:t>
+            </a:r>
+            <a:r>
+              <a:rPr lang="en-US" sz="1200" b="0" i="0" kern="1200" dirty="0">
+                <a:solidFill>
+                  <a:schemeClr val="tx1"/>
+                </a:solidFill>
+                <a:effectLst/>
+                <a:latin typeface="+mn-lt"/>
+                <a:ea typeface="+mn-ea"/>
+                <a:cs typeface="+mn-cs"/>
+              </a:rPr>
+              <a:t> (OIDC) hybrid flow as our most secure authorization method. If your client library doesn’t support this then encrypt the id tokens.</a:t>
+            </a:r>
+            <a:endParaRPr lang="en-US" dirty="0"/>
           </a:p>
           <a:p>
             <a:endParaRPr lang="en-US" dirty="0"/>
@@ -17817,7 +18201,7 @@
           <a:p>
             <a:fld id="{5EE2CF44-2B13-41B4-A334-1CDF534EEBBF}" type="slidenum">
               <a:rPr lang="en-US" smtClean="0"/>
-              <a:t>13</a:t>
+              <a:t>15</a:t>
             </a:fld>
             <a:endParaRPr lang="en-US"/>
           </a:p>
@@ -17836,7 +18220,7 @@
 </p:notes>
 </file>
 
-<file path=ppt/notesSlides/notesSlide13.xml><?xml version="1.0" encoding="utf-8"?>
+<file path=ppt/notesSlides/notesSlide15.xml><?xml version="1.0" encoding="utf-8"?>
 <p:notes xmlns:a="http://schemas.openxmlformats.org/drawingml/2006/main" xmlns:r="http://schemas.openxmlformats.org/officeDocument/2006/relationships" xmlns:p="http://schemas.openxmlformats.org/presentationml/2006/main">
   <p:cSld>
     <p:spTree>
@@ -17934,7 +18318,7 @@
           <a:p>
             <a:fld id="{5EE2CF44-2B13-41B4-A334-1CDF534EEBBF}" type="slidenum">
               <a:rPr lang="en-US" smtClean="0"/>
-              <a:t>14</a:t>
+              <a:t>16</a:t>
             </a:fld>
             <a:endParaRPr lang="en-US"/>
           </a:p>
@@ -17944,174 +18328,6 @@
     <p:extLst>
       <p:ext uri="{BB962C8B-B14F-4D97-AF65-F5344CB8AC3E}">
         <p14:creationId xmlns:p14="http://schemas.microsoft.com/office/powerpoint/2010/main" val="4239065576"/>
-      </p:ext>
-    </p:extLst>
-  </p:cSld>
-  <p:clrMapOvr>
-    <a:masterClrMapping/>
-  </p:clrMapOvr>
-</p:notes>
-</file>
-
-<file path=ppt/notesSlides/notesSlide14.xml><?xml version="1.0" encoding="utf-8"?>
-<p:notes xmlns:a="http://schemas.openxmlformats.org/drawingml/2006/main" xmlns:r="http://schemas.openxmlformats.org/officeDocument/2006/relationships" xmlns:p="http://schemas.openxmlformats.org/presentationml/2006/main">
-  <p:cSld>
-    <p:spTree>
-      <p:nvGrpSpPr>
-        <p:cNvPr id="1" name=""/>
-        <p:cNvGrpSpPr/>
-        <p:nvPr/>
-      </p:nvGrpSpPr>
-      <p:grpSpPr>
-        <a:xfrm>
-          <a:off x="0" y="0"/>
-          <a:ext cx="0" cy="0"/>
-          <a:chOff x="0" y="0"/>
-          <a:chExt cx="0" cy="0"/>
-        </a:xfrm>
-      </p:grpSpPr>
-      <p:sp>
-        <p:nvSpPr>
-          <p:cNvPr id="2" name="Slide Image Placeholder 1"/>
-          <p:cNvSpPr>
-            <a:spLocks noGrp="1" noRot="1" noChangeAspect="1"/>
-          </p:cNvSpPr>
-          <p:nvPr>
-            <p:ph type="sldImg"/>
-          </p:nvPr>
-        </p:nvSpPr>
-        <p:spPr/>
-      </p:sp>
-      <p:sp>
-        <p:nvSpPr>
-          <p:cNvPr id="3" name="Notes Placeholder 2"/>
-          <p:cNvSpPr>
-            <a:spLocks noGrp="1"/>
-          </p:cNvSpPr>
-          <p:nvPr>
-            <p:ph type="body" idx="1"/>
-          </p:nvPr>
-        </p:nvSpPr>
-        <p:spPr/>
-        <p:txBody>
-          <a:bodyPr/>
-          <a:lstStyle/>
-          <a:p>
-            <a:endParaRPr lang="en-US"/>
-          </a:p>
-        </p:txBody>
-      </p:sp>
-      <p:sp>
-        <p:nvSpPr>
-          <p:cNvPr id="4" name="Slide Number Placeholder 3"/>
-          <p:cNvSpPr>
-            <a:spLocks noGrp="1"/>
-          </p:cNvSpPr>
-          <p:nvPr>
-            <p:ph type="sldNum" sz="quarter" idx="10"/>
-          </p:nvPr>
-        </p:nvSpPr>
-        <p:spPr/>
-        <p:txBody>
-          <a:bodyPr/>
-          <a:lstStyle/>
-          <a:p>
-            <a:fld id="{5EE2CF44-2B13-41B4-A334-1CDF534EEBBF}" type="slidenum">
-              <a:rPr lang="en-US" smtClean="0"/>
-              <a:t>15</a:t>
-            </a:fld>
-            <a:endParaRPr lang="en-US"/>
-          </a:p>
-        </p:txBody>
-      </p:sp>
-    </p:spTree>
-    <p:extLst>
-      <p:ext uri="{BB962C8B-B14F-4D97-AF65-F5344CB8AC3E}">
-        <p14:creationId xmlns:p14="http://schemas.microsoft.com/office/powerpoint/2010/main" val="769289572"/>
-      </p:ext>
-    </p:extLst>
-  </p:cSld>
-  <p:clrMapOvr>
-    <a:masterClrMapping/>
-  </p:clrMapOvr>
-</p:notes>
-</file>
-
-<file path=ppt/notesSlides/notesSlide15.xml><?xml version="1.0" encoding="utf-8"?>
-<p:notes xmlns:a="http://schemas.openxmlformats.org/drawingml/2006/main" xmlns:r="http://schemas.openxmlformats.org/officeDocument/2006/relationships" xmlns:p="http://schemas.openxmlformats.org/presentationml/2006/main">
-  <p:cSld>
-    <p:spTree>
-      <p:nvGrpSpPr>
-        <p:cNvPr id="1" name=""/>
-        <p:cNvGrpSpPr/>
-        <p:nvPr/>
-      </p:nvGrpSpPr>
-      <p:grpSpPr>
-        <a:xfrm>
-          <a:off x="0" y="0"/>
-          <a:ext cx="0" cy="0"/>
-          <a:chOff x="0" y="0"/>
-          <a:chExt cx="0" cy="0"/>
-        </a:xfrm>
-      </p:grpSpPr>
-      <p:sp>
-        <p:nvSpPr>
-          <p:cNvPr id="2" name="Slide Image Placeholder 1"/>
-          <p:cNvSpPr>
-            <a:spLocks noGrp="1" noRot="1" noChangeAspect="1"/>
-          </p:cNvSpPr>
-          <p:nvPr>
-            <p:ph type="sldImg"/>
-          </p:nvPr>
-        </p:nvSpPr>
-        <p:spPr/>
-      </p:sp>
-      <p:sp>
-        <p:nvSpPr>
-          <p:cNvPr id="3" name="Notes Placeholder 2"/>
-          <p:cNvSpPr>
-            <a:spLocks noGrp="1"/>
-          </p:cNvSpPr>
-          <p:nvPr>
-            <p:ph type="body" idx="1"/>
-          </p:nvPr>
-        </p:nvSpPr>
-        <p:spPr/>
-        <p:txBody>
-          <a:bodyPr/>
-          <a:lstStyle/>
-          <a:p>
-            <a:endParaRPr lang="en-US"/>
-          </a:p>
-        </p:txBody>
-      </p:sp>
-      <p:sp>
-        <p:nvSpPr>
-          <p:cNvPr id="4" name="Slide Number Placeholder 3"/>
-          <p:cNvSpPr>
-            <a:spLocks noGrp="1"/>
-          </p:cNvSpPr>
-          <p:nvPr>
-            <p:ph type="sldNum" sz="quarter" idx="10"/>
-          </p:nvPr>
-        </p:nvSpPr>
-        <p:spPr/>
-        <p:txBody>
-          <a:bodyPr/>
-          <a:lstStyle/>
-          <a:p>
-            <a:fld id="{5EE2CF44-2B13-41B4-A334-1CDF534EEBBF}" type="slidenum">
-              <a:rPr lang="en-US" smtClean="0"/>
-              <a:t>16</a:t>
-            </a:fld>
-            <a:endParaRPr lang="en-US"/>
-          </a:p>
-        </p:txBody>
-      </p:sp>
-    </p:spTree>
-    <p:extLst>
-      <p:ext uri="{BB962C8B-B14F-4D97-AF65-F5344CB8AC3E}">
-        <p14:creationId xmlns:p14="http://schemas.microsoft.com/office/powerpoint/2010/main" val="1342540446"/>
       </p:ext>
     </p:extLst>
   </p:cSld>
@@ -18198,6 +18414,39 @@
               </a:rPr>
               <a:t> Endpoint is an OAuth 2.0 Protected Resource that returns Claims about the authenticated End-User.</a:t>
             </a:r>
+          </a:p>
+          <a:p>
+            <a:endParaRPr lang="en-US" sz="1200" b="0" i="0" kern="1200" dirty="0">
+              <a:solidFill>
+                <a:schemeClr val="tx1"/>
+              </a:solidFill>
+              <a:effectLst/>
+              <a:latin typeface="+mn-lt"/>
+              <a:ea typeface="+mn-ea"/>
+              <a:cs typeface="+mn-cs"/>
+            </a:endParaRPr>
+          </a:p>
+          <a:p>
+            <a:r>
+              <a:rPr lang="en-US" sz="1200" b="0" i="0" kern="1200" dirty="0">
+                <a:solidFill>
+                  <a:schemeClr val="tx1"/>
+                </a:solidFill>
+                <a:effectLst/>
+                <a:latin typeface="+mn-lt"/>
+                <a:ea typeface="+mn-ea"/>
+                <a:cs typeface="+mn-cs"/>
+              </a:rPr>
+              <a:t>List of endpoints</a:t>
+            </a:r>
+          </a:p>
+          <a:p>
+            <a:r>
+              <a:rPr lang="en-US" dirty="0">
+                <a:hlinkClick r:id="rId3"/>
+              </a:rPr>
+              <a:t>http://docs.identityserver.io/en/latest/endpoints/discovery.html</a:t>
+            </a:r>
             <a:endParaRPr lang="en-US" dirty="0"/>
           </a:p>
         </p:txBody>
@@ -18282,7 +18531,10 @@
           <a:bodyPr/>
           <a:lstStyle/>
           <a:p>
-            <a:endParaRPr lang="en-US"/>
+            <a:r>
+              <a:rPr lang="en-US" dirty="0"/>
+              <a:t>D:\IdentityServer4-master\IdentityServer4-master\samples\Quickstarts\7_EntityFrameworkStorage</a:t>
+            </a:r>
           </a:p>
         </p:txBody>
       </p:sp>
@@ -18312,7 +18564,7 @@
     </p:spTree>
     <p:extLst>
       <p:ext uri="{BB962C8B-B14F-4D97-AF65-F5344CB8AC3E}">
-        <p14:creationId xmlns:p14="http://schemas.microsoft.com/office/powerpoint/2010/main" val="408873660"/>
+        <p14:creationId xmlns:p14="http://schemas.microsoft.com/office/powerpoint/2010/main" val="769289572"/>
       </p:ext>
     </p:extLst>
   </p:cSld>
@@ -18366,7 +18618,7 @@
           <a:bodyPr/>
           <a:lstStyle/>
           <a:p>
-            <a:endParaRPr lang="en-US"/>
+            <a:endParaRPr lang="en-US" dirty="0"/>
           </a:p>
         </p:txBody>
       </p:sp>
@@ -18396,7 +18648,7 @@
     </p:spTree>
     <p:extLst>
       <p:ext uri="{BB962C8B-B14F-4D97-AF65-F5344CB8AC3E}">
-        <p14:creationId xmlns:p14="http://schemas.microsoft.com/office/powerpoint/2010/main" val="400853992"/>
+        <p14:creationId xmlns:p14="http://schemas.microsoft.com/office/powerpoint/2010/main" val="479188316"/>
       </p:ext>
     </p:extLst>
   </p:cSld>
@@ -18480,7 +18732,7 @@
     </p:spTree>
     <p:extLst>
       <p:ext uri="{BB962C8B-B14F-4D97-AF65-F5344CB8AC3E}">
-        <p14:creationId xmlns:p14="http://schemas.microsoft.com/office/powerpoint/2010/main" val="479188316"/>
+        <p14:creationId xmlns:p14="http://schemas.microsoft.com/office/powerpoint/2010/main" val="1342540446"/>
       </p:ext>
     </p:extLst>
   </p:cSld>
@@ -18564,7 +18816,7 @@
     </p:spTree>
     <p:extLst>
       <p:ext uri="{BB962C8B-B14F-4D97-AF65-F5344CB8AC3E}">
-        <p14:creationId xmlns:p14="http://schemas.microsoft.com/office/powerpoint/2010/main" val="3994937494"/>
+        <p14:creationId xmlns:p14="http://schemas.microsoft.com/office/powerpoint/2010/main" val="1144209454"/>
       </p:ext>
     </p:extLst>
   </p:cSld>
@@ -18658,6 +18910,90 @@
 </p:notes>
 </file>
 
+<file path=ppt/notesSlides/notesSlide21.xml><?xml version="1.0" encoding="utf-8"?>
+<p:notes xmlns:a="http://schemas.openxmlformats.org/drawingml/2006/main" xmlns:r="http://schemas.openxmlformats.org/officeDocument/2006/relationships" xmlns:p="http://schemas.openxmlformats.org/presentationml/2006/main">
+  <p:cSld>
+    <p:spTree>
+      <p:nvGrpSpPr>
+        <p:cNvPr id="1" name=""/>
+        <p:cNvGrpSpPr/>
+        <p:nvPr/>
+      </p:nvGrpSpPr>
+      <p:grpSpPr>
+        <a:xfrm>
+          <a:off x="0" y="0"/>
+          <a:ext cx="0" cy="0"/>
+          <a:chOff x="0" y="0"/>
+          <a:chExt cx="0" cy="0"/>
+        </a:xfrm>
+      </p:grpSpPr>
+      <p:sp>
+        <p:nvSpPr>
+          <p:cNvPr id="2" name="Slide Image Placeholder 1"/>
+          <p:cNvSpPr>
+            <a:spLocks noGrp="1" noRot="1" noChangeAspect="1"/>
+          </p:cNvSpPr>
+          <p:nvPr>
+            <p:ph type="sldImg"/>
+          </p:nvPr>
+        </p:nvSpPr>
+        <p:spPr/>
+      </p:sp>
+      <p:sp>
+        <p:nvSpPr>
+          <p:cNvPr id="3" name="Notes Placeholder 2"/>
+          <p:cNvSpPr>
+            <a:spLocks noGrp="1"/>
+          </p:cNvSpPr>
+          <p:nvPr>
+            <p:ph type="body" idx="1"/>
+          </p:nvPr>
+        </p:nvSpPr>
+        <p:spPr/>
+        <p:txBody>
+          <a:bodyPr/>
+          <a:lstStyle/>
+          <a:p>
+            <a:endParaRPr lang="en-US"/>
+          </a:p>
+        </p:txBody>
+      </p:sp>
+      <p:sp>
+        <p:nvSpPr>
+          <p:cNvPr id="4" name="Slide Number Placeholder 3"/>
+          <p:cNvSpPr>
+            <a:spLocks noGrp="1"/>
+          </p:cNvSpPr>
+          <p:nvPr>
+            <p:ph type="sldNum" sz="quarter" idx="10"/>
+          </p:nvPr>
+        </p:nvSpPr>
+        <p:spPr/>
+        <p:txBody>
+          <a:bodyPr/>
+          <a:lstStyle/>
+          <a:p>
+            <a:fld id="{5EE2CF44-2B13-41B4-A334-1CDF534EEBBF}" type="slidenum">
+              <a:rPr lang="en-US" smtClean="0"/>
+              <a:t>24</a:t>
+            </a:fld>
+            <a:endParaRPr lang="en-US"/>
+          </a:p>
+        </p:txBody>
+      </p:sp>
+    </p:spTree>
+    <p:extLst>
+      <p:ext uri="{BB962C8B-B14F-4D97-AF65-F5344CB8AC3E}">
+        <p14:creationId xmlns:p14="http://schemas.microsoft.com/office/powerpoint/2010/main" val="3994937494"/>
+      </p:ext>
+    </p:extLst>
+  </p:cSld>
+  <p:clrMapOvr>
+    <a:masterClrMapping/>
+  </p:clrMapOvr>
+</p:notes>
+</file>
+
 <file path=ppt/notesSlides/notesSlide3.xml><?xml version="1.0" encoding="utf-8"?>
 <p:notes xmlns:a="http://schemas.openxmlformats.org/drawingml/2006/main" xmlns:r="http://schemas.openxmlformats.org/officeDocument/2006/relationships" xmlns:p="http://schemas.openxmlformats.org/presentationml/2006/main">
   <p:cSld>
@@ -18723,7 +19059,7 @@
           <a:p>
             <a:fld id="{5EE2CF44-2B13-41B4-A334-1CDF534EEBBF}" type="slidenum">
               <a:rPr lang="en-US" smtClean="0"/>
-              <a:t>3</a:t>
+              <a:t>4</a:t>
             </a:fld>
             <a:endParaRPr lang="en-US"/>
           </a:p>
@@ -18732,7 +19068,7 @@
     </p:spTree>
     <p:extLst>
       <p:ext uri="{BB962C8B-B14F-4D97-AF65-F5344CB8AC3E}">
-        <p14:creationId xmlns:p14="http://schemas.microsoft.com/office/powerpoint/2010/main" val="1144209454"/>
+        <p14:creationId xmlns:p14="http://schemas.microsoft.com/office/powerpoint/2010/main" val="408873660"/>
       </p:ext>
     </p:extLst>
   </p:cSld>
@@ -18743,6 +19079,90 @@
 </file>
 
 <file path=ppt/notesSlides/notesSlide4.xml><?xml version="1.0" encoding="utf-8"?>
+<p:notes xmlns:a="http://schemas.openxmlformats.org/drawingml/2006/main" xmlns:r="http://schemas.openxmlformats.org/officeDocument/2006/relationships" xmlns:p="http://schemas.openxmlformats.org/presentationml/2006/main">
+  <p:cSld>
+    <p:spTree>
+      <p:nvGrpSpPr>
+        <p:cNvPr id="1" name=""/>
+        <p:cNvGrpSpPr/>
+        <p:nvPr/>
+      </p:nvGrpSpPr>
+      <p:grpSpPr>
+        <a:xfrm>
+          <a:off x="0" y="0"/>
+          <a:ext cx="0" cy="0"/>
+          <a:chOff x="0" y="0"/>
+          <a:chExt cx="0" cy="0"/>
+        </a:xfrm>
+      </p:grpSpPr>
+      <p:sp>
+        <p:nvSpPr>
+          <p:cNvPr id="2" name="Slide Image Placeholder 1"/>
+          <p:cNvSpPr>
+            <a:spLocks noGrp="1" noRot="1" noChangeAspect="1"/>
+          </p:cNvSpPr>
+          <p:nvPr>
+            <p:ph type="sldImg"/>
+          </p:nvPr>
+        </p:nvSpPr>
+        <p:spPr/>
+      </p:sp>
+      <p:sp>
+        <p:nvSpPr>
+          <p:cNvPr id="3" name="Notes Placeholder 2"/>
+          <p:cNvSpPr>
+            <a:spLocks noGrp="1"/>
+          </p:cNvSpPr>
+          <p:nvPr>
+            <p:ph type="body" idx="1"/>
+          </p:nvPr>
+        </p:nvSpPr>
+        <p:spPr/>
+        <p:txBody>
+          <a:bodyPr/>
+          <a:lstStyle/>
+          <a:p>
+            <a:endParaRPr lang="en-US"/>
+          </a:p>
+        </p:txBody>
+      </p:sp>
+      <p:sp>
+        <p:nvSpPr>
+          <p:cNvPr id="4" name="Slide Number Placeholder 3"/>
+          <p:cNvSpPr>
+            <a:spLocks noGrp="1"/>
+          </p:cNvSpPr>
+          <p:nvPr>
+            <p:ph type="sldNum" sz="quarter" idx="10"/>
+          </p:nvPr>
+        </p:nvSpPr>
+        <p:spPr/>
+        <p:txBody>
+          <a:bodyPr/>
+          <a:lstStyle/>
+          <a:p>
+            <a:fld id="{5EE2CF44-2B13-41B4-A334-1CDF534EEBBF}" type="slidenum">
+              <a:rPr lang="en-US" smtClean="0"/>
+              <a:t>5</a:t>
+            </a:fld>
+            <a:endParaRPr lang="en-US"/>
+          </a:p>
+        </p:txBody>
+      </p:sp>
+    </p:spTree>
+    <p:extLst>
+      <p:ext uri="{BB962C8B-B14F-4D97-AF65-F5344CB8AC3E}">
+        <p14:creationId xmlns:p14="http://schemas.microsoft.com/office/powerpoint/2010/main" val="400853992"/>
+      </p:ext>
+    </p:extLst>
+  </p:cSld>
+  <p:clrMapOvr>
+    <a:masterClrMapping/>
+  </p:clrMapOvr>
+</p:notes>
+</file>
+
+<file path=ppt/notesSlides/notesSlide5.xml><?xml version="1.0" encoding="utf-8"?>
 <p:notes xmlns:a="http://schemas.openxmlformats.org/drawingml/2006/main" xmlns:r="http://schemas.openxmlformats.org/officeDocument/2006/relationships" xmlns:p="http://schemas.openxmlformats.org/presentationml/2006/main">
   <p:cSld>
     <p:spTree>
@@ -18810,7 +19230,7 @@
           <a:p>
             <a:fld id="{5EE2CF44-2B13-41B4-A334-1CDF534EEBBF}" type="slidenum">
               <a:rPr lang="en-US" smtClean="0"/>
-              <a:t>5</a:t>
+              <a:t>6</a:t>
             </a:fld>
             <a:endParaRPr lang="en-US"/>
           </a:p>
@@ -18820,90 +19240,6 @@
     <p:extLst>
       <p:ext uri="{BB962C8B-B14F-4D97-AF65-F5344CB8AC3E}">
         <p14:creationId xmlns:p14="http://schemas.microsoft.com/office/powerpoint/2010/main" val="2977833081"/>
-      </p:ext>
-    </p:extLst>
-  </p:cSld>
-  <p:clrMapOvr>
-    <a:masterClrMapping/>
-  </p:clrMapOvr>
-</p:notes>
-</file>
-
-<file path=ppt/notesSlides/notesSlide5.xml><?xml version="1.0" encoding="utf-8"?>
-<p:notes xmlns:a="http://schemas.openxmlformats.org/drawingml/2006/main" xmlns:r="http://schemas.openxmlformats.org/officeDocument/2006/relationships" xmlns:p="http://schemas.openxmlformats.org/presentationml/2006/main">
-  <p:cSld>
-    <p:spTree>
-      <p:nvGrpSpPr>
-        <p:cNvPr id="1" name=""/>
-        <p:cNvGrpSpPr/>
-        <p:nvPr/>
-      </p:nvGrpSpPr>
-      <p:grpSpPr>
-        <a:xfrm>
-          <a:off x="0" y="0"/>
-          <a:ext cx="0" cy="0"/>
-          <a:chOff x="0" y="0"/>
-          <a:chExt cx="0" cy="0"/>
-        </a:xfrm>
-      </p:grpSpPr>
-      <p:sp>
-        <p:nvSpPr>
-          <p:cNvPr id="2" name="Slide Image Placeholder 1"/>
-          <p:cNvSpPr>
-            <a:spLocks noGrp="1" noRot="1" noChangeAspect="1"/>
-          </p:cNvSpPr>
-          <p:nvPr>
-            <p:ph type="sldImg"/>
-          </p:nvPr>
-        </p:nvSpPr>
-        <p:spPr/>
-      </p:sp>
-      <p:sp>
-        <p:nvSpPr>
-          <p:cNvPr id="3" name="Notes Placeholder 2"/>
-          <p:cNvSpPr>
-            <a:spLocks noGrp="1"/>
-          </p:cNvSpPr>
-          <p:nvPr>
-            <p:ph type="body" idx="1"/>
-          </p:nvPr>
-        </p:nvSpPr>
-        <p:spPr/>
-        <p:txBody>
-          <a:bodyPr/>
-          <a:lstStyle/>
-          <a:p>
-            <a:endParaRPr lang="en-US"/>
-          </a:p>
-        </p:txBody>
-      </p:sp>
-      <p:sp>
-        <p:nvSpPr>
-          <p:cNvPr id="4" name="Slide Number Placeholder 3"/>
-          <p:cNvSpPr>
-            <a:spLocks noGrp="1"/>
-          </p:cNvSpPr>
-          <p:nvPr>
-            <p:ph type="sldNum" sz="quarter" idx="10"/>
-          </p:nvPr>
-        </p:nvSpPr>
-        <p:spPr/>
-        <p:txBody>
-          <a:bodyPr/>
-          <a:lstStyle/>
-          <a:p>
-            <a:fld id="{5EE2CF44-2B13-41B4-A334-1CDF534EEBBF}" type="slidenum">
-              <a:rPr lang="en-US" smtClean="0"/>
-              <a:t>6</a:t>
-            </a:fld>
-            <a:endParaRPr lang="en-US"/>
-          </a:p>
-        </p:txBody>
-      </p:sp>
-    </p:spTree>
-    <p:extLst>
-      <p:ext uri="{BB962C8B-B14F-4D97-AF65-F5344CB8AC3E}">
-        <p14:creationId xmlns:p14="http://schemas.microsoft.com/office/powerpoint/2010/main" val="259973983"/>
       </p:ext>
     </p:extLst>
   </p:cSld>
@@ -18987,7 +19323,7 @@
     </p:spTree>
     <p:extLst>
       <p:ext uri="{BB962C8B-B14F-4D97-AF65-F5344CB8AC3E}">
-        <p14:creationId xmlns:p14="http://schemas.microsoft.com/office/powerpoint/2010/main" val="863763069"/>
+        <p14:creationId xmlns:p14="http://schemas.microsoft.com/office/powerpoint/2010/main" val="259973983"/>
       </p:ext>
     </p:extLst>
   </p:cSld>
@@ -19041,19 +19377,7 @@
           <a:bodyPr/>
           <a:lstStyle/>
           <a:p>
-            <a:r>
-              <a:rPr lang="en-US" sz="1200" b="0" i="0" kern="1200" dirty="0">
-                <a:solidFill>
-                  <a:schemeClr val="tx1"/>
-                </a:solidFill>
-                <a:effectLst/>
-                <a:latin typeface="+mn-lt"/>
-                <a:ea typeface="+mn-ea"/>
-                <a:cs typeface="+mn-cs"/>
-              </a:rPr>
-              <a:t>reference tokens is that you have much more control over their lifetime. </a:t>
-            </a:r>
-            <a:endParaRPr lang="en-US" dirty="0"/>
+            <a:endParaRPr lang="en-US"/>
           </a:p>
         </p:txBody>
       </p:sp>
@@ -19083,7 +19407,7 @@
     </p:spTree>
     <p:extLst>
       <p:ext uri="{BB962C8B-B14F-4D97-AF65-F5344CB8AC3E}">
-        <p14:creationId xmlns:p14="http://schemas.microsoft.com/office/powerpoint/2010/main" val="2469334533"/>
+        <p14:creationId xmlns:p14="http://schemas.microsoft.com/office/powerpoint/2010/main" val="863763069"/>
       </p:ext>
     </p:extLst>
   </p:cSld>
@@ -19137,6 +19461,19 @@
           <a:bodyPr/>
           <a:lstStyle/>
           <a:p>
+            <a:pPr fontAlgn="base"/>
+            <a:r>
+              <a:rPr lang="en-US" sz="1200" b="1" i="0" kern="1200" dirty="0">
+                <a:solidFill>
+                  <a:schemeClr val="tx1"/>
+                </a:solidFill>
+                <a:effectLst/>
+                <a:latin typeface="+mn-lt"/>
+                <a:ea typeface="+mn-ea"/>
+                <a:cs typeface="+mn-cs"/>
+              </a:rPr>
+              <a:t>Authorization code flow (front channel + back channel)</a:t>
+            </a:r>
             <a:r>
               <a:rPr lang="en-US" sz="1200" b="0" i="0" kern="1200" dirty="0">
                 <a:solidFill>
@@ -19147,10 +19484,11 @@
                 <a:ea typeface="+mn-ea"/>
                 <a:cs typeface="+mn-cs"/>
               </a:rPr>
-              <a:t>reference tokens is that you have much more control over their lifetime. </a:t>
+              <a:t>, most commonly used process flow.</a:t>
             </a:r>
           </a:p>
           <a:p>
+            <a:pPr fontAlgn="base"/>
             <a:r>
               <a:rPr lang="en-US" sz="1200" b="0" i="0" kern="1200" dirty="0">
                 <a:solidFill>
@@ -19161,9 +19499,50 @@
                 <a:ea typeface="+mn-ea"/>
                 <a:cs typeface="+mn-cs"/>
               </a:rPr>
-              <a:t>recipient then needs to open a back-channel to the token service, send the token to a validation endpoint, and if valid, retrieves the contents as the response.</a:t>
+              <a:t>Auth code exchange for an access-token (using the back-channel)</a:t>
             </a:r>
-            <a:endParaRPr lang="en-US" dirty="0"/>
+          </a:p>
+          <a:p>
+            <a:pPr fontAlgn="base"/>
+            <a:endParaRPr lang="en-US" sz="1200" b="0" i="0" kern="1200" dirty="0">
+              <a:solidFill>
+                <a:schemeClr val="tx1"/>
+              </a:solidFill>
+              <a:effectLst/>
+              <a:latin typeface="+mn-lt"/>
+              <a:ea typeface="+mn-ea"/>
+              <a:cs typeface="+mn-cs"/>
+            </a:endParaRPr>
+          </a:p>
+          <a:p>
+            <a:pPr fontAlgn="base"/>
+            <a:r>
+              <a:rPr lang="en-US" sz="1200" b="0" i="0" kern="1200" dirty="0">
+                <a:solidFill>
+                  <a:schemeClr val="tx1"/>
+                </a:solidFill>
+                <a:effectLst/>
+                <a:latin typeface="+mn-lt"/>
+                <a:ea typeface="+mn-ea"/>
+                <a:cs typeface="+mn-cs"/>
+              </a:rPr>
+              <a:t>The back-channel communication is communication sent out by web server to web server, (vs. front-end channel communication, which is communication between a browser and a web server).</a:t>
+            </a:r>
+          </a:p>
+          <a:p>
+            <a:pPr fontAlgn="base"/>
+            <a:r>
+              <a:rPr lang="en-US" sz="1200" b="0" i="0" kern="1200" dirty="0">
+                <a:solidFill>
+                  <a:schemeClr val="tx1"/>
+                </a:solidFill>
+                <a:effectLst/>
+                <a:latin typeface="+mn-lt"/>
+                <a:ea typeface="+mn-ea"/>
+                <a:cs typeface="+mn-cs"/>
+              </a:rPr>
+              <a:t>Back channel think MVC server talking to the authorization server.</a:t>
+            </a:r>
           </a:p>
         </p:txBody>
       </p:sp>
@@ -19193,7 +19572,7 @@
     </p:spTree>
     <p:extLst>
       <p:ext uri="{BB962C8B-B14F-4D97-AF65-F5344CB8AC3E}">
-        <p14:creationId xmlns:p14="http://schemas.microsoft.com/office/powerpoint/2010/main" val="4033790077"/>
+        <p14:creationId xmlns:p14="http://schemas.microsoft.com/office/powerpoint/2010/main" val="2469334533"/>
       </p:ext>
     </p:extLst>
   </p:cSld>
@@ -19247,6 +19626,19 @@
           <a:bodyPr/>
           <a:lstStyle/>
           <a:p>
+            <a:pPr fontAlgn="base"/>
+            <a:r>
+              <a:rPr lang="en-US" sz="1200" b="1" i="0" kern="1200" dirty="0">
+                <a:solidFill>
+                  <a:schemeClr val="tx1"/>
+                </a:solidFill>
+                <a:effectLst/>
+                <a:latin typeface="+mn-lt"/>
+                <a:ea typeface="+mn-ea"/>
+                <a:cs typeface="+mn-cs"/>
+              </a:rPr>
+              <a:t>Implicit code flow (front channel only)</a:t>
+            </a:r>
             <a:r>
               <a:rPr lang="en-US" sz="1200" b="0" i="0" kern="1200" dirty="0">
                 <a:solidFill>
@@ -19257,9 +19649,32 @@
                 <a:ea typeface="+mn-ea"/>
                 <a:cs typeface="+mn-cs"/>
               </a:rPr>
-              <a:t>“grant type” refers to the way an application gets an access token</a:t>
+              <a:t> , used in pure JS applications (</a:t>
             </a:r>
-            <a:endParaRPr lang="en-US" dirty="0"/>
+            <a:r>
+              <a:rPr lang="en-US" sz="1200" b="0" i="0" kern="1200" dirty="0" err="1">
+                <a:solidFill>
+                  <a:schemeClr val="tx1"/>
+                </a:solidFill>
+                <a:effectLst/>
+                <a:latin typeface="+mn-lt"/>
+                <a:ea typeface="+mn-ea"/>
+                <a:cs typeface="+mn-cs"/>
+              </a:rPr>
+              <a:t>eg.</a:t>
+            </a:r>
+            <a:r>
+              <a:rPr lang="en-US" sz="1200" b="0" i="0" kern="1200" dirty="0">
+                <a:solidFill>
+                  <a:schemeClr val="tx1"/>
+                </a:solidFill>
+                <a:effectLst/>
+                <a:latin typeface="+mn-lt"/>
+                <a:ea typeface="+mn-ea"/>
+                <a:cs typeface="+mn-cs"/>
+              </a:rPr>
+              <a:t> Pure Angular or pure React, Single Page Applications, that do not have a backend web server).</a:t>
+            </a:r>
           </a:p>
         </p:txBody>
       </p:sp>
@@ -19289,7 +19704,7 @@
     </p:spTree>
     <p:extLst>
       <p:ext uri="{BB962C8B-B14F-4D97-AF65-F5344CB8AC3E}">
-        <p14:creationId xmlns:p14="http://schemas.microsoft.com/office/powerpoint/2010/main" val="2984286313"/>
+        <p14:creationId xmlns:p14="http://schemas.microsoft.com/office/powerpoint/2010/main" val="2561324307"/>
       </p:ext>
     </p:extLst>
   </p:cSld>
@@ -19682,7 +20097,7 @@
           <a:p>
             <a:fld id="{37CC0096-1860-4642-9CD2-0079EA5E7CD1}" type="datetimeFigureOut">
               <a:rPr lang="en-US" smtClean="0"/>
-              <a:t>6/13/2018</a:t>
+              <a:t>10/11/2019</a:t>
             </a:fld>
             <a:endParaRPr lang="en-US"/>
           </a:p>
@@ -19861,7 +20276,7 @@
           <a:p>
             <a:fld id="{37CC0096-1860-4642-9CD2-0079EA5E7CD1}" type="datetimeFigureOut">
               <a:rPr lang="en-US" smtClean="0"/>
-              <a:t>6/13/2018</a:t>
+              <a:t>10/11/2019</a:t>
             </a:fld>
             <a:endParaRPr lang="en-US"/>
           </a:p>
@@ -20034,7 +20449,7 @@
           <a:p>
             <a:fld id="{37CC0096-1860-4642-9CD2-0079EA5E7CD1}" type="datetimeFigureOut">
               <a:rPr lang="en-US" smtClean="0"/>
-              <a:t>6/13/2018</a:t>
+              <a:t>10/11/2019</a:t>
             </a:fld>
             <a:endParaRPr lang="en-US"/>
           </a:p>
@@ -20467,7 +20882,7 @@
           <a:p>
             <a:fld id="{37CC0096-1860-4642-9CD2-0079EA5E7CD1}" type="datetimeFigureOut">
               <a:rPr lang="en-US" smtClean="0"/>
-              <a:t>6/13/2018</a:t>
+              <a:t>10/11/2019</a:t>
             </a:fld>
             <a:endParaRPr lang="en-US"/>
           </a:p>
@@ -20906,7 +21321,7 @@
           <a:p>
             <a:fld id="{37CC0096-1860-4642-9CD2-0079EA5E7CD1}" type="datetimeFigureOut">
               <a:rPr lang="en-US" smtClean="0"/>
-              <a:t>6/13/2018</a:t>
+              <a:t>10/11/2019</a:t>
             </a:fld>
             <a:endParaRPr lang="en-US"/>
           </a:p>
@@ -21023,7 +21438,7 @@
           <a:p>
             <a:fld id="{37CC0096-1860-4642-9CD2-0079EA5E7CD1}" type="datetimeFigureOut">
               <a:rPr lang="en-US" smtClean="0"/>
-              <a:t>6/13/2018</a:t>
+              <a:t>10/11/2019</a:t>
             </a:fld>
             <a:endParaRPr lang="en-US"/>
           </a:p>
@@ -21118,7 +21533,7 @@
           <a:p>
             <a:fld id="{37CC0096-1860-4642-9CD2-0079EA5E7CD1}" type="datetimeFigureOut">
               <a:rPr lang="en-US" smtClean="0"/>
-              <a:t>6/13/2018</a:t>
+              <a:t>10/11/2019</a:t>
             </a:fld>
             <a:endParaRPr lang="en-US"/>
           </a:p>
@@ -21402,7 +21817,7 @@
           <a:p>
             <a:fld id="{37CC0096-1860-4642-9CD2-0079EA5E7CD1}" type="datetimeFigureOut">
               <a:rPr lang="en-US" smtClean="0"/>
-              <a:t>6/13/2018</a:t>
+              <a:t>10/11/2019</a:t>
             </a:fld>
             <a:endParaRPr lang="en-US"/>
           </a:p>
@@ -21713,7 +22128,7 @@
           <a:p>
             <a:fld id="{37CC0096-1860-4642-9CD2-0079EA5E7CD1}" type="datetimeFigureOut">
               <a:rPr lang="en-US" smtClean="0"/>
-              <a:t>6/13/2018</a:t>
+              <a:t>10/11/2019</a:t>
             </a:fld>
             <a:endParaRPr lang="en-US"/>
           </a:p>
@@ -21945,7 +22360,7 @@
             <a:fld id="{37CC0096-1860-4642-9CD2-0079EA5E7CD1}" type="datetimeFigureOut">
               <a:rPr lang="en-US" smtClean="0"/>
               <a:pPr/>
-              <a:t>6/13/2018</a:t>
+              <a:t>10/11/2019</a:t>
             </a:fld>
             <a:endParaRPr lang="en-US"/>
           </a:p>
@@ -22331,7 +22746,7 @@
       </a:lvl9pPr>
     </p:otherStyle>
   </p:txStyles>
-  <p:extLst mod="1">
+  <p:extLst>
     <p:ext uri="{27BBF7A9-308A-43DC-89C8-2F10F3537804}">
       <p15:sldGuideLst xmlns:p15="http://schemas.microsoft.com/office/powerpoint/2012/main">
         <p15:guide id="1" orient="horz" pos="2160">
@@ -22700,7 +23115,7 @@
         <p:spPr>
           <a:xfrm>
             <a:off x="1524000" y="3901966"/>
-            <a:ext cx="4572000" cy="646331"/>
+            <a:ext cx="4572000" cy="1200329"/>
           </a:xfrm>
           <a:prstGeom prst="rect">
             <a:avLst/>
@@ -22721,6 +23136,17 @@
             </a:r>
             <a:endParaRPr lang="en-US" sz="3600" dirty="0"/>
           </a:p>
+          <a:p>
+            <a:r>
+              <a:rPr lang="en-US" sz="3600" dirty="0"/>
+              <a:t>@</a:t>
+            </a:r>
+            <a:r>
+              <a:rPr lang="en-US" sz="3600" dirty="0" err="1"/>
+              <a:t>cajunAA</a:t>
+            </a:r>
+            <a:endParaRPr lang="en-US" sz="3600" dirty="0"/>
+          </a:p>
         </p:txBody>
       </p:sp>
     </p:spTree>
@@ -22737,6 +23163,268 @@
 </file>
 
 <file path=ppt/slides/slide10.xml><?xml version="1.0" encoding="utf-8"?>
+<p:sld xmlns:a="http://schemas.openxmlformats.org/drawingml/2006/main" xmlns:r="http://schemas.openxmlformats.org/officeDocument/2006/relationships" xmlns:p="http://schemas.openxmlformats.org/presentationml/2006/main">
+  <p:cSld>
+    <p:spTree>
+      <p:nvGrpSpPr>
+        <p:cNvPr id="1" name=""/>
+        <p:cNvGrpSpPr/>
+        <p:nvPr/>
+      </p:nvGrpSpPr>
+      <p:grpSpPr>
+        <a:xfrm>
+          <a:off x="0" y="0"/>
+          <a:ext cx="0" cy="0"/>
+          <a:chOff x="0" y="0"/>
+          <a:chExt cx="0" cy="0"/>
+        </a:xfrm>
+      </p:grpSpPr>
+      <p:sp>
+        <p:nvSpPr>
+          <p:cNvPr id="2" name="Title 1">
+            <a:extLst>
+              <a:ext uri="{FF2B5EF4-FFF2-40B4-BE49-F238E27FC236}">
+                <a16:creationId xmlns:a16="http://schemas.microsoft.com/office/drawing/2014/main" id="{E8A90DBC-5A74-4572-AE01-AFD9F1764132}"/>
+              </a:ext>
+            </a:extLst>
+          </p:cNvPr>
+          <p:cNvSpPr txBox="1">
+            <a:spLocks/>
+          </p:cNvSpPr>
+          <p:nvPr/>
+        </p:nvSpPr>
+        <p:spPr>
+          <a:xfrm>
+            <a:off x="1513608" y="685800"/>
+            <a:ext cx="9459191" cy="1143000"/>
+          </a:xfrm>
+          <a:prstGeom prst="rect">
+            <a:avLst/>
+          </a:prstGeom>
+        </p:spPr>
+        <p:txBody>
+          <a:bodyPr/>
+          <a:lstStyle>
+            <a:lvl1pPr algn="l" defTabSz="914400" rtl="0" eaLnBrk="1" latinLnBrk="0" hangingPunct="1">
+              <a:lnSpc>
+                <a:spcPct val="90000"/>
+              </a:lnSpc>
+              <a:spcBef>
+                <a:spcPct val="0"/>
+              </a:spcBef>
+              <a:buNone/>
+              <a:defRPr sz="3400" kern="1200">
+                <a:solidFill>
+                  <a:schemeClr val="accent1"/>
+                </a:solidFill>
+                <a:latin typeface="+mj-lt"/>
+                <a:ea typeface="+mj-ea"/>
+                <a:cs typeface="+mj-cs"/>
+              </a:defRPr>
+            </a:lvl1pPr>
+          </a:lstStyle>
+          <a:p>
+            <a:r>
+              <a:rPr lang="en-US" sz="4400" dirty="0"/>
+              <a:t>OAuth 2.0 Implicit Flow</a:t>
+            </a:r>
+            <a:br>
+              <a:rPr lang="en-US" sz="4400" dirty="0"/>
+            </a:br>
+            <a:endParaRPr lang="en-US" sz="4400" dirty="0"/>
+          </a:p>
+        </p:txBody>
+      </p:sp>
+      <p:sp>
+        <p:nvSpPr>
+          <p:cNvPr id="3" name="TextBox 2">
+            <a:extLst>
+              <a:ext uri="{FF2B5EF4-FFF2-40B4-BE49-F238E27FC236}">
+                <a16:creationId xmlns:a16="http://schemas.microsoft.com/office/drawing/2014/main" id="{770FE21A-375C-47FC-B4DE-6FACAA5890A7}"/>
+              </a:ext>
+            </a:extLst>
+          </p:cNvPr>
+          <p:cNvSpPr txBox="1"/>
+          <p:nvPr/>
+        </p:nvSpPr>
+        <p:spPr>
+          <a:xfrm>
+            <a:off x="1513608" y="2362200"/>
+            <a:ext cx="9078191" cy="1938992"/>
+          </a:xfrm>
+          <a:prstGeom prst="rect">
+            <a:avLst/>
+          </a:prstGeom>
+          <a:noFill/>
+        </p:spPr>
+        <p:txBody>
+          <a:bodyPr wrap="square" rtlCol="0">
+            <a:spAutoFit/>
+          </a:bodyPr>
+          <a:lstStyle/>
+          <a:p>
+            <a:r>
+              <a:rPr lang="en-US" sz="4000" dirty="0"/>
+              <a:t>Front Channel </a:t>
+            </a:r>
+          </a:p>
+          <a:p>
+            <a:r>
+              <a:rPr lang="en-US" sz="4000" dirty="0"/>
+              <a:t>(Browser - SPA) </a:t>
+            </a:r>
+          </a:p>
+          <a:p>
+            <a:endParaRPr lang="en-US" sz="4000" dirty="0"/>
+          </a:p>
+        </p:txBody>
+      </p:sp>
+    </p:spTree>
+    <p:extLst>
+      <p:ext uri="{BB962C8B-B14F-4D97-AF65-F5344CB8AC3E}">
+        <p14:creationId xmlns:p14="http://schemas.microsoft.com/office/powerpoint/2010/main" val="381106095"/>
+      </p:ext>
+    </p:extLst>
+  </p:cSld>
+  <p:clrMapOvr>
+    <a:masterClrMapping/>
+  </p:clrMapOvr>
+</p:sld>
+</file>
+
+<file path=ppt/slides/slide11.xml><?xml version="1.0" encoding="utf-8"?>
+<p:sld xmlns:a="http://schemas.openxmlformats.org/drawingml/2006/main" xmlns:r="http://schemas.openxmlformats.org/officeDocument/2006/relationships" xmlns:p="http://schemas.openxmlformats.org/presentationml/2006/main">
+  <p:cSld>
+    <p:spTree>
+      <p:nvGrpSpPr>
+        <p:cNvPr id="1" name=""/>
+        <p:cNvGrpSpPr/>
+        <p:nvPr/>
+      </p:nvGrpSpPr>
+      <p:grpSpPr>
+        <a:xfrm>
+          <a:off x="0" y="0"/>
+          <a:ext cx="0" cy="0"/>
+          <a:chOff x="0" y="0"/>
+          <a:chExt cx="0" cy="0"/>
+        </a:xfrm>
+      </p:grpSpPr>
+      <p:sp>
+        <p:nvSpPr>
+          <p:cNvPr id="2" name="Title 1">
+            <a:extLst>
+              <a:ext uri="{FF2B5EF4-FFF2-40B4-BE49-F238E27FC236}">
+                <a16:creationId xmlns:a16="http://schemas.microsoft.com/office/drawing/2014/main" id="{E8A90DBC-5A74-4572-AE01-AFD9F1764132}"/>
+              </a:ext>
+            </a:extLst>
+          </p:cNvPr>
+          <p:cNvSpPr txBox="1">
+            <a:spLocks/>
+          </p:cNvSpPr>
+          <p:nvPr/>
+        </p:nvSpPr>
+        <p:spPr>
+          <a:xfrm>
+            <a:off x="1513608" y="685800"/>
+            <a:ext cx="9459191" cy="1143000"/>
+          </a:xfrm>
+          <a:prstGeom prst="rect">
+            <a:avLst/>
+          </a:prstGeom>
+        </p:spPr>
+        <p:txBody>
+          <a:bodyPr/>
+          <a:lstStyle>
+            <a:lvl1pPr algn="l" defTabSz="914400" rtl="0" eaLnBrk="1" latinLnBrk="0" hangingPunct="1">
+              <a:lnSpc>
+                <a:spcPct val="90000"/>
+              </a:lnSpc>
+              <a:spcBef>
+                <a:spcPct val="0"/>
+              </a:spcBef>
+              <a:buNone/>
+              <a:defRPr sz="3400" kern="1200">
+                <a:solidFill>
+                  <a:schemeClr val="accent1"/>
+                </a:solidFill>
+                <a:latin typeface="+mj-lt"/>
+                <a:ea typeface="+mj-ea"/>
+                <a:cs typeface="+mj-cs"/>
+              </a:defRPr>
+            </a:lvl1pPr>
+          </a:lstStyle>
+          <a:p>
+            <a:r>
+              <a:rPr lang="en-US" sz="4400" dirty="0"/>
+              <a:t>OAuth 2.0 Access Tokens</a:t>
+            </a:r>
+          </a:p>
+        </p:txBody>
+      </p:sp>
+      <p:sp>
+        <p:nvSpPr>
+          <p:cNvPr id="3" name="TextBox 2">
+            <a:extLst>
+              <a:ext uri="{FF2B5EF4-FFF2-40B4-BE49-F238E27FC236}">
+                <a16:creationId xmlns:a16="http://schemas.microsoft.com/office/drawing/2014/main" id="{770FE21A-375C-47FC-B4DE-6FACAA5890A7}"/>
+              </a:ext>
+            </a:extLst>
+          </p:cNvPr>
+          <p:cNvSpPr txBox="1"/>
+          <p:nvPr/>
+        </p:nvSpPr>
+        <p:spPr>
+          <a:xfrm>
+            <a:off x="1513608" y="2362200"/>
+            <a:ext cx="9078191" cy="2554545"/>
+          </a:xfrm>
+          <a:prstGeom prst="rect">
+            <a:avLst/>
+          </a:prstGeom>
+          <a:noFill/>
+        </p:spPr>
+        <p:txBody>
+          <a:bodyPr wrap="square" rtlCol="0">
+            <a:spAutoFit/>
+          </a:bodyPr>
+          <a:lstStyle/>
+          <a:p>
+            <a:r>
+              <a:rPr lang="en-US" sz="4000" dirty="0"/>
+              <a:t>Reference</a:t>
+            </a:r>
+          </a:p>
+          <a:p>
+            <a:endParaRPr lang="en-US" sz="4000" dirty="0"/>
+          </a:p>
+          <a:p>
+            <a:r>
+              <a:rPr lang="en-US" sz="4000" dirty="0"/>
+              <a:t>Self contained – JWT</a:t>
+            </a:r>
+          </a:p>
+          <a:p>
+            <a:r>
+              <a:rPr lang="en-US" sz="4000" dirty="0"/>
+              <a:t>	- JWT.IO </a:t>
+            </a:r>
+          </a:p>
+        </p:txBody>
+      </p:sp>
+    </p:spTree>
+    <p:extLst>
+      <p:ext uri="{BB962C8B-B14F-4D97-AF65-F5344CB8AC3E}">
+        <p14:creationId xmlns:p14="http://schemas.microsoft.com/office/powerpoint/2010/main" val="2057785949"/>
+      </p:ext>
+    </p:extLst>
+  </p:cSld>
+  <p:clrMapOvr>
+    <a:masterClrMapping/>
+  </p:clrMapOvr>
+</p:sld>
+</file>
+
+<file path=ppt/slides/slide12.xml><?xml version="1.0" encoding="utf-8"?>
 <p:sld xmlns:a="http://schemas.openxmlformats.org/drawingml/2006/main" xmlns:r="http://schemas.openxmlformats.org/officeDocument/2006/relationships" xmlns:p="http://schemas.openxmlformats.org/presentationml/2006/main">
   <p:cSld>
     <p:spTree>
@@ -24056,7 +24744,7 @@
 </p:sld>
 </file>
 
-<file path=ppt/slides/slide11.xml><?xml version="1.0" encoding="utf-8"?>
+<file path=ppt/slides/slide13.xml><?xml version="1.0" encoding="utf-8"?>
 <p:sld xmlns:a="http://schemas.openxmlformats.org/drawingml/2006/main" xmlns:r="http://schemas.openxmlformats.org/officeDocument/2006/relationships" xmlns:p="http://schemas.openxmlformats.org/presentationml/2006/main">
   <p:cSld>
     <p:spTree>
@@ -24142,7 +24830,7 @@
 </p:sld>
 </file>
 
-<file path=ppt/slides/slide12.xml><?xml version="1.0" encoding="utf-8"?>
+<file path=ppt/slides/slide14.xml><?xml version="1.0" encoding="utf-8"?>
 <p:sld xmlns:a="http://schemas.openxmlformats.org/drawingml/2006/main" xmlns:r="http://schemas.openxmlformats.org/officeDocument/2006/relationships" xmlns:p="http://schemas.openxmlformats.org/presentationml/2006/main">
   <p:cSld>
     <p:spTree>
@@ -24230,7 +24918,7 @@
         <p:spPr>
           <a:xfrm>
             <a:off x="1513608" y="2438400"/>
-            <a:ext cx="9078191" cy="3170099"/>
+            <a:ext cx="9078191" cy="3785652"/>
           </a:xfrm>
           <a:prstGeom prst="rect">
             <a:avLst/>
@@ -24245,7 +24933,13 @@
           <a:p>
             <a:r>
               <a:rPr lang="en-US" sz="4000" dirty="0"/>
-              <a:t>Authorization Code (PKCE)</a:t>
+              <a:t>Authorization Code </a:t>
+            </a:r>
+          </a:p>
+          <a:p>
+            <a:r>
+              <a:rPr lang="en-US" sz="4000" dirty="0"/>
+              <a:t>	(with or without PKCE)</a:t>
             </a:r>
           </a:p>
           <a:p>
@@ -24281,7 +24975,7 @@
 </p:sld>
 </file>
 
-<file path=ppt/slides/slide13.xml><?xml version="1.0" encoding="utf-8"?>
+<file path=ppt/slides/slide15.xml><?xml version="1.0" encoding="utf-8"?>
 <p:sld xmlns:a="http://schemas.openxmlformats.org/drawingml/2006/main" xmlns:r="http://schemas.openxmlformats.org/officeDocument/2006/relationships" xmlns:p="http://schemas.openxmlformats.org/presentationml/2006/main">
   <p:cSld>
     <p:spTree>
@@ -24393,7 +25087,7 @@
 </p:sld>
 </file>
 
-<file path=ppt/slides/slide14.xml><?xml version="1.0" encoding="utf-8"?>
+<file path=ppt/slides/slide16.xml><?xml version="1.0" encoding="utf-8"?>
 <p:sld xmlns:a="http://schemas.openxmlformats.org/drawingml/2006/main" xmlns:r="http://schemas.openxmlformats.org/officeDocument/2006/relationships" xmlns:p="http://schemas.openxmlformats.org/presentationml/2006/main">
   <p:cSld>
     <p:spTree>
@@ -24948,636 +25642,6 @@
     <p:extLst>
       <p:ext uri="{BB962C8B-B14F-4D97-AF65-F5344CB8AC3E}">
         <p14:creationId xmlns:p14="http://schemas.microsoft.com/office/powerpoint/2010/main" val="653640473"/>
-      </p:ext>
-    </p:extLst>
-  </p:cSld>
-  <p:clrMapOvr>
-    <a:masterClrMapping/>
-  </p:clrMapOvr>
-</p:sld>
-</file>
-
-<file path=ppt/slides/slide15.xml><?xml version="1.0" encoding="utf-8"?>
-<p:sld xmlns:a="http://schemas.openxmlformats.org/drawingml/2006/main" xmlns:r="http://schemas.openxmlformats.org/officeDocument/2006/relationships" xmlns:p="http://schemas.openxmlformats.org/presentationml/2006/main">
-  <p:cSld>
-    <p:spTree>
-      <p:nvGrpSpPr>
-        <p:cNvPr id="1" name=""/>
-        <p:cNvGrpSpPr/>
-        <p:nvPr/>
-      </p:nvGrpSpPr>
-      <p:grpSpPr>
-        <a:xfrm>
-          <a:off x="0" y="0"/>
-          <a:ext cx="0" cy="0"/>
-          <a:chOff x="0" y="0"/>
-          <a:chExt cx="0" cy="0"/>
-        </a:xfrm>
-      </p:grpSpPr>
-      <p:sp>
-        <p:nvSpPr>
-          <p:cNvPr id="16" name="Title 1">
-            <a:extLst>
-              <a:ext uri="{FF2B5EF4-FFF2-40B4-BE49-F238E27FC236}">
-                <a16:creationId xmlns:a16="http://schemas.microsoft.com/office/drawing/2014/main" id="{56C355D7-835D-4886-AE1D-7C522FFFED23}"/>
-              </a:ext>
-            </a:extLst>
-          </p:cNvPr>
-          <p:cNvSpPr>
-            <a:spLocks noGrp="1"/>
-          </p:cNvSpPr>
-          <p:nvPr>
-            <p:ph type="title"/>
-          </p:nvPr>
-        </p:nvSpPr>
-        <p:spPr>
-          <a:xfrm>
-            <a:off x="1524000" y="1828800"/>
-            <a:ext cx="9144000" cy="2743200"/>
-          </a:xfrm>
-        </p:spPr>
-        <p:txBody>
-          <a:bodyPr>
-            <a:normAutofit/>
-          </a:bodyPr>
-          <a:lstStyle/>
-          <a:p>
-            <a:r>
-              <a:rPr lang="en-US" sz="9600" dirty="0">
-                <a:solidFill>
-                  <a:schemeClr val="tx1"/>
-                </a:solidFill>
-              </a:rPr>
-              <a:t>DEMO 2</a:t>
-            </a:r>
-            <a:endParaRPr sz="9600" dirty="0">
-              <a:solidFill>
-                <a:schemeClr val="tx1"/>
-              </a:solidFill>
-            </a:endParaRPr>
-          </a:p>
-        </p:txBody>
-      </p:sp>
-      <p:sp>
-        <p:nvSpPr>
-          <p:cNvPr id="17" name="Text Placeholder 2">
-            <a:extLst>
-              <a:ext uri="{FF2B5EF4-FFF2-40B4-BE49-F238E27FC236}">
-                <a16:creationId xmlns:a16="http://schemas.microsoft.com/office/drawing/2014/main" id="{277976DD-7432-4283-BDCF-51430EB88C49}"/>
-              </a:ext>
-            </a:extLst>
-          </p:cNvPr>
-          <p:cNvSpPr txBox="1">
-            <a:spLocks/>
-          </p:cNvSpPr>
-          <p:nvPr/>
-        </p:nvSpPr>
-        <p:spPr>
-          <a:xfrm>
-            <a:off x="1524000" y="4589463"/>
-            <a:ext cx="9144000" cy="1506537"/>
-          </a:xfrm>
-          <a:prstGeom prst="rect">
-            <a:avLst/>
-          </a:prstGeom>
-        </p:spPr>
-        <p:txBody>
-          <a:bodyPr/>
-          <a:lstStyle>
-            <a:lvl1pPr marL="228600" indent="-228600" algn="l" defTabSz="914400" rtl="0" eaLnBrk="1" latinLnBrk="0" hangingPunct="1">
-              <a:lnSpc>
-                <a:spcPct val="90000"/>
-              </a:lnSpc>
-              <a:spcBef>
-                <a:spcPts val="1800"/>
-              </a:spcBef>
-              <a:buClr>
-                <a:schemeClr val="accent1"/>
-              </a:buClr>
-              <a:buFont typeface="Arial" pitchFamily="34" charset="0"/>
-              <a:buChar char="•"/>
-              <a:defRPr sz="2000" kern="1200">
-                <a:solidFill>
-                  <a:schemeClr val="tx1">
-                    <a:lumMod val="85000"/>
-                  </a:schemeClr>
-                </a:solidFill>
-                <a:latin typeface="+mn-lt"/>
-                <a:ea typeface="+mn-ea"/>
-                <a:cs typeface="+mn-cs"/>
-              </a:defRPr>
-            </a:lvl1pPr>
-            <a:lvl2pPr marL="594360" indent="-228600" algn="l" defTabSz="914400" rtl="0" eaLnBrk="1" latinLnBrk="0" hangingPunct="1">
-              <a:lnSpc>
-                <a:spcPct val="90000"/>
-              </a:lnSpc>
-              <a:spcBef>
-                <a:spcPts val="1000"/>
-              </a:spcBef>
-              <a:buClr>
-                <a:schemeClr val="accent1"/>
-              </a:buClr>
-              <a:buFont typeface="Arial" pitchFamily="34" charset="0"/>
-              <a:buChar char="•"/>
-              <a:defRPr sz="1800" kern="1200">
-                <a:solidFill>
-                  <a:schemeClr val="tx1">
-                    <a:lumMod val="85000"/>
-                  </a:schemeClr>
-                </a:solidFill>
-                <a:latin typeface="+mn-lt"/>
-                <a:ea typeface="+mn-ea"/>
-                <a:cs typeface="+mn-cs"/>
-              </a:defRPr>
-            </a:lvl2pPr>
-            <a:lvl3pPr marL="914400" indent="-228600" algn="l" defTabSz="914400" rtl="0" eaLnBrk="1" latinLnBrk="0" hangingPunct="1">
-              <a:lnSpc>
-                <a:spcPct val="90000"/>
-              </a:lnSpc>
-              <a:spcBef>
-                <a:spcPts val="800"/>
-              </a:spcBef>
-              <a:buClr>
-                <a:schemeClr val="accent1"/>
-              </a:buClr>
-              <a:buFont typeface="Arial" pitchFamily="34" charset="0"/>
-              <a:buChar char="•"/>
-              <a:defRPr sz="1600" kern="1200">
-                <a:solidFill>
-                  <a:schemeClr val="tx1">
-                    <a:lumMod val="85000"/>
-                  </a:schemeClr>
-                </a:solidFill>
-                <a:latin typeface="+mn-lt"/>
-                <a:ea typeface="+mn-ea"/>
-                <a:cs typeface="+mn-cs"/>
-              </a:defRPr>
-            </a:lvl3pPr>
-            <a:lvl4pPr marL="1234440" indent="-228600" algn="l" defTabSz="914400" rtl="0" eaLnBrk="1" latinLnBrk="0" hangingPunct="1">
-              <a:lnSpc>
-                <a:spcPct val="90000"/>
-              </a:lnSpc>
-              <a:spcBef>
-                <a:spcPts val="800"/>
-              </a:spcBef>
-              <a:buClr>
-                <a:schemeClr val="accent1"/>
-              </a:buClr>
-              <a:buFont typeface="Arial" pitchFamily="34" charset="0"/>
-              <a:buChar char="•"/>
-              <a:defRPr sz="1400" kern="1200">
-                <a:solidFill>
-                  <a:schemeClr val="tx1">
-                    <a:lumMod val="85000"/>
-                  </a:schemeClr>
-                </a:solidFill>
-                <a:latin typeface="+mn-lt"/>
-                <a:ea typeface="+mn-ea"/>
-                <a:cs typeface="+mn-cs"/>
-              </a:defRPr>
-            </a:lvl4pPr>
-            <a:lvl5pPr marL="1508760" indent="-228600" algn="l" defTabSz="914400" rtl="0" eaLnBrk="1" latinLnBrk="0" hangingPunct="1">
-              <a:lnSpc>
-                <a:spcPct val="90000"/>
-              </a:lnSpc>
-              <a:spcBef>
-                <a:spcPts val="800"/>
-              </a:spcBef>
-              <a:buClr>
-                <a:schemeClr val="accent1"/>
-              </a:buClr>
-              <a:buFont typeface="Arial" pitchFamily="34" charset="0"/>
-              <a:buChar char="•"/>
-              <a:defRPr sz="1400" kern="1200">
-                <a:solidFill>
-                  <a:schemeClr val="tx1">
-                    <a:lumMod val="85000"/>
-                  </a:schemeClr>
-                </a:solidFill>
-                <a:latin typeface="+mn-lt"/>
-                <a:ea typeface="+mn-ea"/>
-                <a:cs typeface="+mn-cs"/>
-              </a:defRPr>
-            </a:lvl5pPr>
-            <a:lvl6pPr marL="1783080" indent="-228600" algn="l" defTabSz="914400" rtl="0" eaLnBrk="1" latinLnBrk="0" hangingPunct="1">
-              <a:lnSpc>
-                <a:spcPct val="90000"/>
-              </a:lnSpc>
-              <a:spcBef>
-                <a:spcPts val="800"/>
-              </a:spcBef>
-              <a:buClr>
-                <a:schemeClr val="accent1"/>
-              </a:buClr>
-              <a:buFont typeface="Arial" pitchFamily="34" charset="0"/>
-              <a:buChar char="•"/>
-              <a:defRPr sz="1400" kern="1200">
-                <a:solidFill>
-                  <a:schemeClr val="tx1"/>
-                </a:solidFill>
-                <a:latin typeface="+mn-lt"/>
-                <a:ea typeface="+mn-ea"/>
-                <a:cs typeface="+mn-cs"/>
-              </a:defRPr>
-            </a:lvl6pPr>
-            <a:lvl7pPr marL="2057400" indent="-228600" algn="l" defTabSz="914400" rtl="0" eaLnBrk="1" latinLnBrk="0" hangingPunct="1">
-              <a:lnSpc>
-                <a:spcPct val="90000"/>
-              </a:lnSpc>
-              <a:spcBef>
-                <a:spcPts val="800"/>
-              </a:spcBef>
-              <a:buClr>
-                <a:schemeClr val="accent1"/>
-              </a:buClr>
-              <a:buFont typeface="Arial" pitchFamily="34" charset="0"/>
-              <a:buChar char="•"/>
-              <a:defRPr sz="1400" kern="1200">
-                <a:solidFill>
-                  <a:schemeClr val="tx1"/>
-                </a:solidFill>
-                <a:latin typeface="+mn-lt"/>
-                <a:ea typeface="+mn-ea"/>
-                <a:cs typeface="+mn-cs"/>
-              </a:defRPr>
-            </a:lvl7pPr>
-            <a:lvl8pPr marL="2331720" indent="-228600" algn="l" defTabSz="914400" rtl="0" eaLnBrk="1" latinLnBrk="0" hangingPunct="1">
-              <a:lnSpc>
-                <a:spcPct val="90000"/>
-              </a:lnSpc>
-              <a:spcBef>
-                <a:spcPts val="800"/>
-              </a:spcBef>
-              <a:buClr>
-                <a:schemeClr val="accent1"/>
-              </a:buClr>
-              <a:buFont typeface="Arial" pitchFamily="34" charset="0"/>
-              <a:buChar char="•"/>
-              <a:defRPr sz="1400" kern="1200">
-                <a:solidFill>
-                  <a:schemeClr val="tx1"/>
-                </a:solidFill>
-                <a:latin typeface="+mn-lt"/>
-                <a:ea typeface="+mn-ea"/>
-                <a:cs typeface="+mn-cs"/>
-              </a:defRPr>
-            </a:lvl8pPr>
-            <a:lvl9pPr marL="2606040" indent="-228600" algn="l" defTabSz="914400" rtl="0" eaLnBrk="1" latinLnBrk="0" hangingPunct="1">
-              <a:lnSpc>
-                <a:spcPct val="90000"/>
-              </a:lnSpc>
-              <a:spcBef>
-                <a:spcPts val="800"/>
-              </a:spcBef>
-              <a:buClr>
-                <a:schemeClr val="accent1"/>
-              </a:buClr>
-              <a:buFont typeface="Arial" pitchFamily="34" charset="0"/>
-              <a:buChar char="•"/>
-              <a:defRPr sz="1400" kern="1200">
-                <a:solidFill>
-                  <a:schemeClr val="tx1"/>
-                </a:solidFill>
-                <a:latin typeface="+mn-lt"/>
-                <a:ea typeface="+mn-ea"/>
-                <a:cs typeface="+mn-cs"/>
-              </a:defRPr>
-            </a:lvl9pPr>
-          </a:lstStyle>
-          <a:p>
-            <a:pPr marL="0" indent="0">
-              <a:buNone/>
-            </a:pPr>
-            <a:r>
-              <a:rPr lang="en-US" sz="3600" dirty="0">
-                <a:solidFill>
-                  <a:schemeClr val="accent1"/>
-                </a:solidFill>
-              </a:rPr>
-              <a:t>MVC Web Application Authentication &amp; Authorization</a:t>
-            </a:r>
-          </a:p>
-        </p:txBody>
-      </p:sp>
-    </p:spTree>
-    <p:extLst>
-      <p:ext uri="{BB962C8B-B14F-4D97-AF65-F5344CB8AC3E}">
-        <p14:creationId xmlns:p14="http://schemas.microsoft.com/office/powerpoint/2010/main" val="215988672"/>
-      </p:ext>
-    </p:extLst>
-  </p:cSld>
-  <p:clrMapOvr>
-    <a:masterClrMapping/>
-  </p:clrMapOvr>
-</p:sld>
-</file>
-
-<file path=ppt/slides/slide16.xml><?xml version="1.0" encoding="utf-8"?>
-<p:sld xmlns:a="http://schemas.openxmlformats.org/drawingml/2006/main" xmlns:r="http://schemas.openxmlformats.org/officeDocument/2006/relationships" xmlns:p="http://schemas.openxmlformats.org/presentationml/2006/main">
-  <p:cSld>
-    <p:spTree>
-      <p:nvGrpSpPr>
-        <p:cNvPr id="1" name=""/>
-        <p:cNvGrpSpPr/>
-        <p:nvPr/>
-      </p:nvGrpSpPr>
-      <p:grpSpPr>
-        <a:xfrm>
-          <a:off x="0" y="0"/>
-          <a:ext cx="0" cy="0"/>
-          <a:chOff x="0" y="0"/>
-          <a:chExt cx="0" cy="0"/>
-        </a:xfrm>
-      </p:grpSpPr>
-      <p:sp>
-        <p:nvSpPr>
-          <p:cNvPr id="3" name="Title 1">
-            <a:extLst>
-              <a:ext uri="{FF2B5EF4-FFF2-40B4-BE49-F238E27FC236}">
-                <a16:creationId xmlns:a16="http://schemas.microsoft.com/office/drawing/2014/main" id="{0324EB00-6A85-4BB4-9EB7-EEC9353B6F4D}"/>
-              </a:ext>
-            </a:extLst>
-          </p:cNvPr>
-          <p:cNvSpPr>
-            <a:spLocks noGrp="1"/>
-          </p:cNvSpPr>
-          <p:nvPr>
-            <p:ph type="title"/>
-          </p:nvPr>
-        </p:nvSpPr>
-        <p:spPr>
-          <a:xfrm>
-            <a:off x="1524000" y="1828800"/>
-            <a:ext cx="9144000" cy="2743200"/>
-          </a:xfrm>
-        </p:spPr>
-        <p:txBody>
-          <a:bodyPr>
-            <a:normAutofit/>
-          </a:bodyPr>
-          <a:lstStyle/>
-          <a:p>
-            <a:r>
-              <a:rPr lang="en-US" sz="9600" dirty="0">
-                <a:solidFill>
-                  <a:schemeClr val="tx1"/>
-                </a:solidFill>
-              </a:rPr>
-              <a:t>DEMO 3</a:t>
-            </a:r>
-            <a:endParaRPr sz="9600" dirty="0">
-              <a:solidFill>
-                <a:schemeClr val="tx1"/>
-              </a:solidFill>
-            </a:endParaRPr>
-          </a:p>
-        </p:txBody>
-      </p:sp>
-      <p:sp>
-        <p:nvSpPr>
-          <p:cNvPr id="4" name="Text Placeholder 2">
-            <a:extLst>
-              <a:ext uri="{FF2B5EF4-FFF2-40B4-BE49-F238E27FC236}">
-                <a16:creationId xmlns:a16="http://schemas.microsoft.com/office/drawing/2014/main" id="{0A48BF52-5FE0-4078-AEC7-3BA4144BF70A}"/>
-              </a:ext>
-            </a:extLst>
-          </p:cNvPr>
-          <p:cNvSpPr txBox="1">
-            <a:spLocks/>
-          </p:cNvSpPr>
-          <p:nvPr/>
-        </p:nvSpPr>
-        <p:spPr>
-          <a:xfrm>
-            <a:off x="1524000" y="4589463"/>
-            <a:ext cx="9144000" cy="1506537"/>
-          </a:xfrm>
-          <a:prstGeom prst="rect">
-            <a:avLst/>
-          </a:prstGeom>
-        </p:spPr>
-        <p:txBody>
-          <a:bodyPr/>
-          <a:lstStyle>
-            <a:lvl1pPr marL="228600" indent="-228600" algn="l" defTabSz="914400" rtl="0" eaLnBrk="1" latinLnBrk="0" hangingPunct="1">
-              <a:lnSpc>
-                <a:spcPct val="90000"/>
-              </a:lnSpc>
-              <a:spcBef>
-                <a:spcPts val="1800"/>
-              </a:spcBef>
-              <a:buClr>
-                <a:schemeClr val="accent1"/>
-              </a:buClr>
-              <a:buFont typeface="Arial" pitchFamily="34" charset="0"/>
-              <a:buChar char="•"/>
-              <a:defRPr sz="2000" kern="1200">
-                <a:solidFill>
-                  <a:schemeClr val="tx1">
-                    <a:lumMod val="85000"/>
-                  </a:schemeClr>
-                </a:solidFill>
-                <a:latin typeface="+mn-lt"/>
-                <a:ea typeface="+mn-ea"/>
-                <a:cs typeface="+mn-cs"/>
-              </a:defRPr>
-            </a:lvl1pPr>
-            <a:lvl2pPr marL="594360" indent="-228600" algn="l" defTabSz="914400" rtl="0" eaLnBrk="1" latinLnBrk="0" hangingPunct="1">
-              <a:lnSpc>
-                <a:spcPct val="90000"/>
-              </a:lnSpc>
-              <a:spcBef>
-                <a:spcPts val="1000"/>
-              </a:spcBef>
-              <a:buClr>
-                <a:schemeClr val="accent1"/>
-              </a:buClr>
-              <a:buFont typeface="Arial" pitchFamily="34" charset="0"/>
-              <a:buChar char="•"/>
-              <a:defRPr sz="1800" kern="1200">
-                <a:solidFill>
-                  <a:schemeClr val="tx1">
-                    <a:lumMod val="85000"/>
-                  </a:schemeClr>
-                </a:solidFill>
-                <a:latin typeface="+mn-lt"/>
-                <a:ea typeface="+mn-ea"/>
-                <a:cs typeface="+mn-cs"/>
-              </a:defRPr>
-            </a:lvl2pPr>
-            <a:lvl3pPr marL="914400" indent="-228600" algn="l" defTabSz="914400" rtl="0" eaLnBrk="1" latinLnBrk="0" hangingPunct="1">
-              <a:lnSpc>
-                <a:spcPct val="90000"/>
-              </a:lnSpc>
-              <a:spcBef>
-                <a:spcPts val="800"/>
-              </a:spcBef>
-              <a:buClr>
-                <a:schemeClr val="accent1"/>
-              </a:buClr>
-              <a:buFont typeface="Arial" pitchFamily="34" charset="0"/>
-              <a:buChar char="•"/>
-              <a:defRPr sz="1600" kern="1200">
-                <a:solidFill>
-                  <a:schemeClr val="tx1">
-                    <a:lumMod val="85000"/>
-                  </a:schemeClr>
-                </a:solidFill>
-                <a:latin typeface="+mn-lt"/>
-                <a:ea typeface="+mn-ea"/>
-                <a:cs typeface="+mn-cs"/>
-              </a:defRPr>
-            </a:lvl3pPr>
-            <a:lvl4pPr marL="1234440" indent="-228600" algn="l" defTabSz="914400" rtl="0" eaLnBrk="1" latinLnBrk="0" hangingPunct="1">
-              <a:lnSpc>
-                <a:spcPct val="90000"/>
-              </a:lnSpc>
-              <a:spcBef>
-                <a:spcPts val="800"/>
-              </a:spcBef>
-              <a:buClr>
-                <a:schemeClr val="accent1"/>
-              </a:buClr>
-              <a:buFont typeface="Arial" pitchFamily="34" charset="0"/>
-              <a:buChar char="•"/>
-              <a:defRPr sz="1400" kern="1200">
-                <a:solidFill>
-                  <a:schemeClr val="tx1">
-                    <a:lumMod val="85000"/>
-                  </a:schemeClr>
-                </a:solidFill>
-                <a:latin typeface="+mn-lt"/>
-                <a:ea typeface="+mn-ea"/>
-                <a:cs typeface="+mn-cs"/>
-              </a:defRPr>
-            </a:lvl4pPr>
-            <a:lvl5pPr marL="1508760" indent="-228600" algn="l" defTabSz="914400" rtl="0" eaLnBrk="1" latinLnBrk="0" hangingPunct="1">
-              <a:lnSpc>
-                <a:spcPct val="90000"/>
-              </a:lnSpc>
-              <a:spcBef>
-                <a:spcPts val="800"/>
-              </a:spcBef>
-              <a:buClr>
-                <a:schemeClr val="accent1"/>
-              </a:buClr>
-              <a:buFont typeface="Arial" pitchFamily="34" charset="0"/>
-              <a:buChar char="•"/>
-              <a:defRPr sz="1400" kern="1200">
-                <a:solidFill>
-                  <a:schemeClr val="tx1">
-                    <a:lumMod val="85000"/>
-                  </a:schemeClr>
-                </a:solidFill>
-                <a:latin typeface="+mn-lt"/>
-                <a:ea typeface="+mn-ea"/>
-                <a:cs typeface="+mn-cs"/>
-              </a:defRPr>
-            </a:lvl5pPr>
-            <a:lvl6pPr marL="1783080" indent="-228600" algn="l" defTabSz="914400" rtl="0" eaLnBrk="1" latinLnBrk="0" hangingPunct="1">
-              <a:lnSpc>
-                <a:spcPct val="90000"/>
-              </a:lnSpc>
-              <a:spcBef>
-                <a:spcPts val="800"/>
-              </a:spcBef>
-              <a:buClr>
-                <a:schemeClr val="accent1"/>
-              </a:buClr>
-              <a:buFont typeface="Arial" pitchFamily="34" charset="0"/>
-              <a:buChar char="•"/>
-              <a:defRPr sz="1400" kern="1200">
-                <a:solidFill>
-                  <a:schemeClr val="tx1"/>
-                </a:solidFill>
-                <a:latin typeface="+mn-lt"/>
-                <a:ea typeface="+mn-ea"/>
-                <a:cs typeface="+mn-cs"/>
-              </a:defRPr>
-            </a:lvl6pPr>
-            <a:lvl7pPr marL="2057400" indent="-228600" algn="l" defTabSz="914400" rtl="0" eaLnBrk="1" latinLnBrk="0" hangingPunct="1">
-              <a:lnSpc>
-                <a:spcPct val="90000"/>
-              </a:lnSpc>
-              <a:spcBef>
-                <a:spcPts val="800"/>
-              </a:spcBef>
-              <a:buClr>
-                <a:schemeClr val="accent1"/>
-              </a:buClr>
-              <a:buFont typeface="Arial" pitchFamily="34" charset="0"/>
-              <a:buChar char="•"/>
-              <a:defRPr sz="1400" kern="1200">
-                <a:solidFill>
-                  <a:schemeClr val="tx1"/>
-                </a:solidFill>
-                <a:latin typeface="+mn-lt"/>
-                <a:ea typeface="+mn-ea"/>
-                <a:cs typeface="+mn-cs"/>
-              </a:defRPr>
-            </a:lvl7pPr>
-            <a:lvl8pPr marL="2331720" indent="-228600" algn="l" defTabSz="914400" rtl="0" eaLnBrk="1" latinLnBrk="0" hangingPunct="1">
-              <a:lnSpc>
-                <a:spcPct val="90000"/>
-              </a:lnSpc>
-              <a:spcBef>
-                <a:spcPts val="800"/>
-              </a:spcBef>
-              <a:buClr>
-                <a:schemeClr val="accent1"/>
-              </a:buClr>
-              <a:buFont typeface="Arial" pitchFamily="34" charset="0"/>
-              <a:buChar char="•"/>
-              <a:defRPr sz="1400" kern="1200">
-                <a:solidFill>
-                  <a:schemeClr val="tx1"/>
-                </a:solidFill>
-                <a:latin typeface="+mn-lt"/>
-                <a:ea typeface="+mn-ea"/>
-                <a:cs typeface="+mn-cs"/>
-              </a:defRPr>
-            </a:lvl8pPr>
-            <a:lvl9pPr marL="2606040" indent="-228600" algn="l" defTabSz="914400" rtl="0" eaLnBrk="1" latinLnBrk="0" hangingPunct="1">
-              <a:lnSpc>
-                <a:spcPct val="90000"/>
-              </a:lnSpc>
-              <a:spcBef>
-                <a:spcPts val="800"/>
-              </a:spcBef>
-              <a:buClr>
-                <a:schemeClr val="accent1"/>
-              </a:buClr>
-              <a:buFont typeface="Arial" pitchFamily="34" charset="0"/>
-              <a:buChar char="•"/>
-              <a:defRPr sz="1400" kern="1200">
-                <a:solidFill>
-                  <a:schemeClr val="tx1"/>
-                </a:solidFill>
-                <a:latin typeface="+mn-lt"/>
-                <a:ea typeface="+mn-ea"/>
-                <a:cs typeface="+mn-cs"/>
-              </a:defRPr>
-            </a:lvl9pPr>
-          </a:lstStyle>
-          <a:p>
-            <a:pPr marL="0" indent="0">
-              <a:buNone/>
-            </a:pPr>
-            <a:r>
-              <a:rPr lang="en-US" sz="3600" dirty="0">
-                <a:solidFill>
-                  <a:schemeClr val="accent1"/>
-                </a:solidFill>
-              </a:rPr>
-              <a:t>SPA Web Application Authentication &amp; Authorization</a:t>
-            </a:r>
-          </a:p>
-        </p:txBody>
-      </p:sp>
-    </p:spTree>
-    <p:extLst>
-      <p:ext uri="{BB962C8B-B14F-4D97-AF65-F5344CB8AC3E}">
-        <p14:creationId xmlns:p14="http://schemas.microsoft.com/office/powerpoint/2010/main" val="620669015"/>
       </p:ext>
     </p:extLst>
   </p:cSld>
@@ -26293,7 +26357,13 @@
       </p:grpSpPr>
       <p:sp>
         <p:nvSpPr>
-          <p:cNvPr id="2" name="Title 1"/>
+          <p:cNvPr id="16" name="Title 1">
+            <a:extLst>
+              <a:ext uri="{FF2B5EF4-FFF2-40B4-BE49-F238E27FC236}">
+                <a16:creationId xmlns:a16="http://schemas.microsoft.com/office/drawing/2014/main" id="{56C355D7-835D-4886-AE1D-7C522FFFED23}"/>
+              </a:ext>
+            </a:extLst>
+          </p:cNvPr>
           <p:cNvSpPr>
             <a:spLocks noGrp="1"/>
           </p:cNvSpPr>
@@ -26303,8 +26373,8 @@
         </p:nvSpPr>
         <p:spPr>
           <a:xfrm>
-            <a:off x="1527048" y="228600"/>
-            <a:ext cx="9144000" cy="1143000"/>
+            <a:off x="1524000" y="1828800"/>
+            <a:ext cx="9144000" cy="2743200"/>
           </a:xfrm>
         </p:spPr>
         <p:txBody>
@@ -26314,183 +26384,27 @@
           <a:lstStyle/>
           <a:p>
             <a:r>
-              <a:rPr lang="en-US" sz="4400" dirty="0"/>
-              <a:t>OAuth 2.0 Spec Links</a:t>
+              <a:rPr lang="en-US" sz="9600" dirty="0">
+                <a:solidFill>
+                  <a:schemeClr val="tx1"/>
+                </a:solidFill>
+              </a:rPr>
+              <a:t>DEMO 2</a:t>
             </a:r>
-            <a:endParaRPr sz="4400" dirty="0"/>
+            <a:endParaRPr sz="9600" dirty="0">
+              <a:solidFill>
+                <a:schemeClr val="tx1"/>
+              </a:solidFill>
+            </a:endParaRPr>
           </a:p>
         </p:txBody>
       </p:sp>
       <p:sp>
         <p:nvSpPr>
-          <p:cNvPr id="4" name="Content Placeholder 3"/>
-          <p:cNvSpPr>
-            <a:spLocks noGrp="1"/>
-          </p:cNvSpPr>
-          <p:nvPr>
-            <p:ph sz="half" idx="2"/>
-          </p:nvPr>
-        </p:nvSpPr>
-        <p:spPr>
-          <a:xfrm>
-            <a:off x="1527048" y="2514600"/>
-            <a:ext cx="9979152" cy="4267200"/>
-          </a:xfrm>
-        </p:spPr>
-        <p:txBody>
-          <a:bodyPr>
-            <a:noAutofit/>
-          </a:bodyPr>
-          <a:lstStyle/>
-          <a:p>
-            <a:pPr marL="0" indent="0">
-              <a:buNone/>
-            </a:pPr>
-            <a:r>
-              <a:rPr lang="en-US" b="1" dirty="0"/>
-              <a:t>OAuth 2.0 Core</a:t>
-            </a:r>
-          </a:p>
-          <a:p>
-            <a:r>
-              <a:rPr lang="en-US" dirty="0">
-                <a:hlinkClick r:id="rId3"/>
-              </a:rPr>
-              <a:t>OAuth 2.0 Framework</a:t>
-            </a:r>
-            <a:r>
-              <a:rPr lang="en-US" dirty="0"/>
-              <a:t> — RFC 6749</a:t>
-            </a:r>
-          </a:p>
-          <a:p>
-            <a:r>
-              <a:rPr lang="en-US" dirty="0">
-                <a:hlinkClick r:id="rId4"/>
-              </a:rPr>
-              <a:t>Bearer Token Usage</a:t>
-            </a:r>
-            <a:r>
-              <a:rPr lang="en-US" dirty="0"/>
-              <a:t> — RFC 6750</a:t>
-            </a:r>
-          </a:p>
-          <a:p>
-            <a:r>
-              <a:rPr lang="en-US" dirty="0">
-                <a:hlinkClick r:id="rId5"/>
-              </a:rPr>
-              <a:t>Threat Model and Security Considerations</a:t>
-            </a:r>
-            <a:r>
-              <a:rPr lang="en-US" dirty="0"/>
-              <a:t> — RFC 6819</a:t>
-            </a:r>
-          </a:p>
-          <a:p>
-            <a:pPr marL="0" indent="0">
-              <a:buNone/>
-            </a:pPr>
-            <a:r>
-              <a:rPr lang="en-US" b="1" dirty="0"/>
-              <a:t>OAuth 2.0 Extensions</a:t>
-            </a:r>
-          </a:p>
-          <a:p>
-            <a:r>
-              <a:rPr lang="en-US" dirty="0">
-                <a:hlinkClick r:id="rId6"/>
-              </a:rPr>
-              <a:t>JSON Web Token</a:t>
-            </a:r>
-            <a:r>
-              <a:rPr lang="en-US" dirty="0"/>
-              <a:t> — RFC 7519</a:t>
-            </a:r>
-          </a:p>
-          <a:p>
-            <a:r>
-              <a:rPr lang="en-US" dirty="0">
-                <a:hlinkClick r:id="rId7"/>
-              </a:rPr>
-              <a:t>OAuth Assertions Framework</a:t>
-            </a:r>
-            <a:r>
-              <a:rPr lang="en-US" dirty="0"/>
-              <a:t> — RFC 7521</a:t>
-            </a:r>
-          </a:p>
-          <a:p>
-            <a:r>
-              <a:rPr lang="en-US" dirty="0">
-                <a:hlinkClick r:id="rId8"/>
-              </a:rPr>
-              <a:t>SAML2 Bearer Assertion</a:t>
-            </a:r>
-            <a:r>
-              <a:rPr lang="en-US" dirty="0"/>
-              <a:t> — RFC 7522, for integrating with existing identity systems</a:t>
-            </a:r>
-          </a:p>
-          <a:p>
-            <a:r>
-              <a:rPr lang="en-US" dirty="0">
-                <a:hlinkClick r:id="rId9"/>
-              </a:rPr>
-              <a:t>JWT Bearer Assertion</a:t>
-            </a:r>
-            <a:r>
-              <a:rPr lang="en-US" dirty="0"/>
-              <a:t> — RFC 7523, for integrating with existing identity</a:t>
-            </a:r>
-          </a:p>
-          <a:p>
-            <a:pPr marL="0" indent="0">
-              <a:buNone/>
-            </a:pPr>
-            <a:endParaRPr lang="en-US" dirty="0"/>
-          </a:p>
-          <a:p>
-            <a:endParaRPr dirty="0"/>
-          </a:p>
-        </p:txBody>
-      </p:sp>
-    </p:spTree>
-    <p:extLst>
-      <p:ext uri="{BB962C8B-B14F-4D97-AF65-F5344CB8AC3E}">
-        <p14:creationId xmlns:p14="http://schemas.microsoft.com/office/powerpoint/2010/main" val="1475842300"/>
-      </p:ext>
-    </p:extLst>
-  </p:cSld>
-  <p:clrMapOvr>
-    <a:masterClrMapping/>
-  </p:clrMapOvr>
-</p:sld>
-</file>
-
-<file path=ppt/slides/slide19.xml><?xml version="1.0" encoding="utf-8"?>
-<p:sld xmlns:a="http://schemas.openxmlformats.org/drawingml/2006/main" xmlns:r="http://schemas.openxmlformats.org/officeDocument/2006/relationships" xmlns:p="http://schemas.openxmlformats.org/presentationml/2006/main">
-  <p:cSld>
-    <p:spTree>
-      <p:nvGrpSpPr>
-        <p:cNvPr id="1" name=""/>
-        <p:cNvGrpSpPr/>
-        <p:nvPr/>
-      </p:nvGrpSpPr>
-      <p:grpSpPr>
-        <a:xfrm>
-          <a:off x="0" y="0"/>
-          <a:ext cx="0" cy="0"/>
-          <a:chOff x="0" y="0"/>
-          <a:chExt cx="0" cy="0"/>
-        </a:xfrm>
-      </p:grpSpPr>
-      <p:sp>
-        <p:nvSpPr>
-          <p:cNvPr id="2" name="Title 1">
+          <p:cNvPr id="17" name="Text Placeholder 2">
             <a:extLst>
               <a:ext uri="{FF2B5EF4-FFF2-40B4-BE49-F238E27FC236}">
-                <a16:creationId xmlns:a16="http://schemas.microsoft.com/office/drawing/2014/main" id="{528E7B88-B875-46B6-894C-F15F86ACEE9B}"/>
+                <a16:creationId xmlns:a16="http://schemas.microsoft.com/office/drawing/2014/main" id="{277976DD-7432-4283-BDCF-51430EB88C49}"/>
               </a:ext>
             </a:extLst>
           </p:cNvPr>
@@ -26501,71 +26415,15 @@
         </p:nvSpPr>
         <p:spPr>
           <a:xfrm>
-            <a:off x="1514348" y="609600"/>
-            <a:ext cx="9144000" cy="1143000"/>
+            <a:off x="1524000" y="4589463"/>
+            <a:ext cx="9144000" cy="1506537"/>
           </a:xfrm>
           <a:prstGeom prst="rect">
             <a:avLst/>
           </a:prstGeom>
         </p:spPr>
         <p:txBody>
-          <a:bodyPr>
-            <a:normAutofit/>
-          </a:bodyPr>
-          <a:lstStyle>
-            <a:lvl1pPr algn="l" defTabSz="914400" rtl="0" eaLnBrk="1" latinLnBrk="0" hangingPunct="1">
-              <a:lnSpc>
-                <a:spcPct val="90000"/>
-              </a:lnSpc>
-              <a:spcBef>
-                <a:spcPct val="0"/>
-              </a:spcBef>
-              <a:buNone/>
-              <a:defRPr sz="3400" kern="1200">
-                <a:solidFill>
-                  <a:schemeClr val="accent1"/>
-                </a:solidFill>
-                <a:latin typeface="+mj-lt"/>
-                <a:ea typeface="+mj-ea"/>
-                <a:cs typeface="+mj-cs"/>
-              </a:defRPr>
-            </a:lvl1pPr>
-          </a:lstStyle>
-          <a:p>
-            <a:r>
-              <a:rPr lang="en-US" sz="4400" dirty="0"/>
-              <a:t>OpenID Connect Spec Links</a:t>
-            </a:r>
-          </a:p>
-        </p:txBody>
-      </p:sp>
-      <p:sp>
-        <p:nvSpPr>
-          <p:cNvPr id="3" name="Content Placeholder 3">
-            <a:extLst>
-              <a:ext uri="{FF2B5EF4-FFF2-40B4-BE49-F238E27FC236}">
-                <a16:creationId xmlns:a16="http://schemas.microsoft.com/office/drawing/2014/main" id="{E1B43815-5897-4532-920B-396CD518DD7F}"/>
-              </a:ext>
-            </a:extLst>
-          </p:cNvPr>
-          <p:cNvSpPr txBox="1">
-            <a:spLocks/>
-          </p:cNvSpPr>
-          <p:nvPr/>
-        </p:nvSpPr>
-        <p:spPr>
-          <a:xfrm>
-            <a:off x="1527048" y="2514600"/>
-            <a:ext cx="9979152" cy="4267200"/>
-          </a:xfrm>
-          <a:prstGeom prst="rect">
-            <a:avLst/>
-          </a:prstGeom>
-        </p:spPr>
-        <p:txBody>
-          <a:bodyPr>
-            <a:normAutofit/>
-          </a:bodyPr>
+          <a:bodyPr/>
           <a:lstStyle>
             <a:lvl1pPr marL="228600" indent="-228600" algn="l" defTabSz="914400" rtl="0" eaLnBrk="1" latinLnBrk="0" hangingPunct="1">
               <a:lnSpc>
@@ -26769,48 +26627,23 @@
           </a:lstStyle>
           <a:p>
             <a:pPr marL="0" indent="0">
-              <a:buFont typeface="Arial" pitchFamily="34" charset="0"/>
               <a:buNone/>
             </a:pPr>
             <a:r>
-              <a:rPr lang="en-US" sz="3200" b="1" dirty="0"/>
-              <a:t>OpenID Connect</a:t>
+              <a:rPr lang="en-US" sz="3600" dirty="0">
+                <a:solidFill>
+                  <a:schemeClr val="accent1"/>
+                </a:solidFill>
+              </a:rPr>
+              <a:t>MVC Web Application Authentication &amp; Authorization</a:t>
             </a:r>
-          </a:p>
-          <a:p>
-            <a:r>
-              <a:rPr lang="en-US" sz="3200" dirty="0">
-                <a:hlinkClick r:id="rId3"/>
-              </a:rPr>
-              <a:t>Core 1.0</a:t>
-            </a:r>
-            <a:endParaRPr lang="en-US" sz="3200" dirty="0"/>
-          </a:p>
-          <a:p>
-            <a:r>
-              <a:rPr lang="en-US" sz="3200" dirty="0">
-                <a:hlinkClick r:id="rId4"/>
-              </a:rPr>
-              <a:t>Discovery</a:t>
-            </a:r>
-            <a:endParaRPr lang="en-US" sz="3200" dirty="0"/>
-          </a:p>
-          <a:p>
-            <a:pPr marL="0" indent="0">
-              <a:buFont typeface="Arial" pitchFamily="34" charset="0"/>
-              <a:buNone/>
-            </a:pPr>
-            <a:endParaRPr lang="en-US" dirty="0"/>
-          </a:p>
-          <a:p>
-            <a:endParaRPr lang="en-US" dirty="0"/>
           </a:p>
         </p:txBody>
       </p:sp>
     </p:spTree>
     <p:extLst>
       <p:ext uri="{BB962C8B-B14F-4D97-AF65-F5344CB8AC3E}">
-        <p14:creationId xmlns:p14="http://schemas.microsoft.com/office/powerpoint/2010/main" val="2231221510"/>
+        <p14:creationId xmlns:p14="http://schemas.microsoft.com/office/powerpoint/2010/main" val="215988672"/>
       </p:ext>
     </p:extLst>
   </p:cSld>
@@ -26820,162 +26653,7 @@
 </p:sld>
 </file>
 
-<file path=ppt/slides/slide2.xml><?xml version="1.0" encoding="utf-8"?>
-<p:sld xmlns:a="http://schemas.openxmlformats.org/drawingml/2006/main" xmlns:r="http://schemas.openxmlformats.org/officeDocument/2006/relationships" xmlns:p="http://schemas.openxmlformats.org/presentationml/2006/main">
-  <p:cSld>
-    <p:spTree>
-      <p:nvGrpSpPr>
-        <p:cNvPr id="1" name=""/>
-        <p:cNvGrpSpPr/>
-        <p:nvPr/>
-      </p:nvGrpSpPr>
-      <p:grpSpPr>
-        <a:xfrm>
-          <a:off x="0" y="0"/>
-          <a:ext cx="0" cy="0"/>
-          <a:chOff x="0" y="0"/>
-          <a:chExt cx="0" cy="0"/>
-        </a:xfrm>
-      </p:grpSpPr>
-      <p:sp>
-        <p:nvSpPr>
-          <p:cNvPr id="13" name="Title 12"/>
-          <p:cNvSpPr>
-            <a:spLocks noGrp="1"/>
-          </p:cNvSpPr>
-          <p:nvPr>
-            <p:ph type="title"/>
-          </p:nvPr>
-        </p:nvSpPr>
-        <p:spPr>
-          <a:xfrm>
-            <a:off x="1600200" y="838200"/>
-            <a:ext cx="9567530" cy="1143000"/>
-          </a:xfrm>
-        </p:spPr>
-        <p:txBody>
-          <a:bodyPr>
-            <a:noAutofit/>
-          </a:bodyPr>
-          <a:lstStyle/>
-          <a:p>
-            <a:r>
-              <a:rPr lang="en-US" sz="4400" dirty="0"/>
-              <a:t>Where to get this presentation and the resources?</a:t>
-            </a:r>
-            <a:endParaRPr sz="4400" dirty="0"/>
-          </a:p>
-        </p:txBody>
-      </p:sp>
-      <p:sp>
-        <p:nvSpPr>
-          <p:cNvPr id="14" name="Content Placeholder 13"/>
-          <p:cNvSpPr>
-            <a:spLocks noGrp="1"/>
-          </p:cNvSpPr>
-          <p:nvPr>
-            <p:ph idx="1"/>
-          </p:nvPr>
-        </p:nvSpPr>
-        <p:spPr>
-          <a:xfrm>
-            <a:off x="1524000" y="2590800"/>
-            <a:ext cx="9144000" cy="3505200"/>
-          </a:xfrm>
-        </p:spPr>
-        <p:txBody>
-          <a:bodyPr>
-            <a:noAutofit/>
-          </a:bodyPr>
-          <a:lstStyle/>
-          <a:p>
-            <a:r>
-              <a:rPr lang="en-US" dirty="0">
-                <a:hlinkClick r:id="rId3"/>
-              </a:rPr>
-              <a:t>IdentityServer4 Demos 1 &amp; 2</a:t>
-            </a:r>
-            <a:endParaRPr lang="en-US" dirty="0"/>
-          </a:p>
-          <a:p>
-            <a:r>
-              <a:rPr lang="en-US" dirty="0">
-                <a:hlinkClick r:id="rId4"/>
-              </a:rPr>
-              <a:t>IdentityServer4 Demo 3</a:t>
-            </a:r>
-            <a:endParaRPr lang="en-US" dirty="0"/>
-          </a:p>
-          <a:p>
-            <a:r>
-              <a:rPr lang="en-US" dirty="0">
-                <a:hlinkClick r:id="rId5"/>
-              </a:rPr>
-              <a:t>OIDC JavaScript client</a:t>
-            </a:r>
-            <a:endParaRPr lang="en-US" dirty="0"/>
-          </a:p>
-          <a:p>
-            <a:r>
-              <a:rPr lang="en-US" dirty="0">
-                <a:hlinkClick r:id="rId6"/>
-              </a:rPr>
-              <a:t>OpenID Connect Implementations</a:t>
-            </a:r>
-            <a:endParaRPr dirty="0"/>
-          </a:p>
-          <a:p>
-            <a:r>
-              <a:rPr lang="en-US" dirty="0">
-                <a:hlinkClick r:id="rId7"/>
-              </a:rPr>
-              <a:t>iOS OAuth 2.0 &amp; OpenID Connect example</a:t>
-            </a:r>
-            <a:endParaRPr lang="en-US" dirty="0"/>
-          </a:p>
-          <a:p>
-            <a:r>
-              <a:rPr lang="en-US" dirty="0">
-                <a:hlinkClick r:id="rId8"/>
-              </a:rPr>
-              <a:t>Xamarin example</a:t>
-            </a:r>
-            <a:endParaRPr lang="en-US" dirty="0"/>
-          </a:p>
-          <a:p>
-            <a:r>
-              <a:rPr lang="en-US" dirty="0">
-                <a:hlinkClick r:id="rId9"/>
-              </a:rPr>
-              <a:t>OAuth 2.0 --rfc6749</a:t>
-            </a:r>
-            <a:endParaRPr lang="en-US" dirty="0"/>
-          </a:p>
-          <a:p>
-            <a:r>
-              <a:rPr lang="en-US" dirty="0">
-                <a:hlinkClick r:id="rId10"/>
-              </a:rPr>
-              <a:t>OpenID Connect</a:t>
-            </a:r>
-            <a:endParaRPr dirty="0"/>
-          </a:p>
-        </p:txBody>
-      </p:sp>
-    </p:spTree>
-    <p:extLst>
-      <p:ext uri="{BB962C8B-B14F-4D97-AF65-F5344CB8AC3E}">
-        <p14:creationId xmlns:p14="http://schemas.microsoft.com/office/powerpoint/2010/main" val="3042826300"/>
-      </p:ext>
-    </p:extLst>
-  </p:cSld>
-  <p:clrMapOvr>
-    <a:masterClrMapping/>
-  </p:clrMapOvr>
-</p:sld>
-</file>
-
-<file path=ppt/slides/slide20.xml><?xml version="1.0" encoding="utf-8"?>
+<file path=ppt/slides/slide19.xml><?xml version="1.0" encoding="utf-8"?>
 <p:sld xmlns:a="http://schemas.openxmlformats.org/drawingml/2006/main" xmlns:r="http://schemas.openxmlformats.org/officeDocument/2006/relationships" xmlns:p="http://schemas.openxmlformats.org/presentationml/2006/main">
   <p:cSld>
     <p:spTree>
@@ -27062,8 +26740,8 @@
         </p:nvSpPr>
         <p:spPr>
           <a:xfrm>
-            <a:off x="1527048" y="2514600"/>
-            <a:ext cx="9979152" cy="4267200"/>
+            <a:off x="1527048" y="1905000"/>
+            <a:ext cx="9979152" cy="4876800"/>
           </a:xfrm>
           <a:prstGeom prst="rect">
             <a:avLst/>
@@ -27071,7 +26749,7 @@
         </p:spPr>
         <p:txBody>
           <a:bodyPr>
-            <a:normAutofit lnSpcReduction="10000"/>
+            <a:normAutofit fontScale="85000" lnSpcReduction="20000"/>
           </a:bodyPr>
           <a:lstStyle>
             <a:lvl1pPr marL="228600" indent="-228600" algn="l" defTabSz="914400" rtl="0" eaLnBrk="1" latinLnBrk="0" hangingPunct="1">
@@ -27329,6 +27007,21 @@
             <a:endParaRPr lang="en-US" sz="3200" dirty="0"/>
           </a:p>
           <a:p>
+            <a:r>
+              <a:rPr lang="en-US" sz="3200" dirty="0">
+                <a:hlinkClick r:id="rId9"/>
+              </a:rPr>
+              <a:t>https://github.com/IdentityServer/IdentityServer4/tree/master/samples/Quickstarts</a:t>
+            </a:r>
+            <a:endParaRPr lang="en-US" sz="3200" dirty="0"/>
+          </a:p>
+          <a:p>
+            <a:r>
+              <a:rPr lang="en-US" sz="3200" dirty="0">
+                <a:hlinkClick r:id="rId10"/>
+              </a:rPr>
+              <a:t>https://www.scottbrady91.com/Identity-Server/Encrypting-Identity-Tokens-in-IdentityServer4</a:t>
+            </a:r>
             <a:endParaRPr lang="en-US" sz="3200" dirty="0"/>
           </a:p>
           <a:p>
@@ -27347,6 +27040,454 @@
     <p:extLst>
       <p:ext uri="{BB962C8B-B14F-4D97-AF65-F5344CB8AC3E}">
         <p14:creationId xmlns:p14="http://schemas.microsoft.com/office/powerpoint/2010/main" val="3048582351"/>
+      </p:ext>
+    </p:extLst>
+  </p:cSld>
+  <p:clrMapOvr>
+    <a:masterClrMapping/>
+  </p:clrMapOvr>
+</p:sld>
+</file>
+
+<file path=ppt/slides/slide2.xml><?xml version="1.0" encoding="utf-8"?>
+<p:sld xmlns:a="http://schemas.openxmlformats.org/drawingml/2006/main" xmlns:r="http://schemas.openxmlformats.org/officeDocument/2006/relationships" xmlns:p="http://schemas.openxmlformats.org/presentationml/2006/main">
+  <p:cSld>
+    <p:spTree>
+      <p:nvGrpSpPr>
+        <p:cNvPr id="1" name=""/>
+        <p:cNvGrpSpPr/>
+        <p:nvPr/>
+      </p:nvGrpSpPr>
+      <p:grpSpPr>
+        <a:xfrm>
+          <a:off x="0" y="0"/>
+          <a:ext cx="0" cy="0"/>
+          <a:chOff x="0" y="0"/>
+          <a:chExt cx="0" cy="0"/>
+        </a:xfrm>
+      </p:grpSpPr>
+      <p:sp>
+        <p:nvSpPr>
+          <p:cNvPr id="2" name="Title 1"/>
+          <p:cNvSpPr>
+            <a:spLocks noGrp="1"/>
+          </p:cNvSpPr>
+          <p:nvPr>
+            <p:ph type="title"/>
+          </p:nvPr>
+        </p:nvSpPr>
+        <p:spPr>
+          <a:xfrm>
+            <a:off x="1600200" y="228600"/>
+            <a:ext cx="9144000" cy="1143000"/>
+          </a:xfrm>
+        </p:spPr>
+        <p:txBody>
+          <a:bodyPr>
+            <a:normAutofit/>
+          </a:bodyPr>
+          <a:lstStyle/>
+          <a:p>
+            <a:r>
+              <a:rPr lang="en-US" sz="4400" dirty="0"/>
+              <a:t>What will you learn today?</a:t>
+            </a:r>
+            <a:endParaRPr sz="4400" dirty="0"/>
+          </a:p>
+        </p:txBody>
+      </p:sp>
+      <p:sp>
+        <p:nvSpPr>
+          <p:cNvPr id="3" name="Content Placeholder 2">
+            <a:extLst>
+              <a:ext uri="{FF2B5EF4-FFF2-40B4-BE49-F238E27FC236}">
+                <a16:creationId xmlns:a16="http://schemas.microsoft.com/office/drawing/2014/main" id="{15175691-DCD4-4687-8530-7083D741AF52}"/>
+              </a:ext>
+            </a:extLst>
+          </p:cNvPr>
+          <p:cNvSpPr>
+            <a:spLocks noGrp="1"/>
+          </p:cNvSpPr>
+          <p:nvPr>
+            <p:ph idx="1"/>
+          </p:nvPr>
+        </p:nvSpPr>
+        <p:spPr>
+          <a:xfrm>
+            <a:off x="1524000" y="2580167"/>
+            <a:ext cx="9144000" cy="4267200"/>
+          </a:xfrm>
+        </p:spPr>
+        <p:txBody>
+          <a:bodyPr>
+            <a:normAutofit/>
+          </a:bodyPr>
+          <a:lstStyle/>
+          <a:p>
+            <a:r>
+              <a:rPr lang="en-US" sz="3200" dirty="0"/>
+              <a:t>An overview of OAuth 2.0 and OpenID Connect protocols.</a:t>
+            </a:r>
+          </a:p>
+          <a:p>
+            <a:r>
+              <a:rPr lang="en-US" sz="3200" dirty="0"/>
+              <a:t>How IdentityServer4 can be used to secure your API’s, Web, Console/Services and Mobile applications.</a:t>
+            </a:r>
+          </a:p>
+          <a:p>
+            <a:r>
+              <a:rPr lang="en-US" sz="3200" dirty="0"/>
+              <a:t>How IdentityServer4 can be used to implement an SSO solution</a:t>
+            </a:r>
+          </a:p>
+        </p:txBody>
+      </p:sp>
+    </p:spTree>
+    <p:extLst>
+      <p:ext uri="{BB962C8B-B14F-4D97-AF65-F5344CB8AC3E}">
+        <p14:creationId xmlns:p14="http://schemas.microsoft.com/office/powerpoint/2010/main" val="2116190161"/>
+      </p:ext>
+    </p:extLst>
+  </p:cSld>
+  <p:clrMapOvr>
+    <a:masterClrMapping/>
+  </p:clrMapOvr>
+</p:sld>
+</file>
+
+<file path=ppt/slides/slide20.xml><?xml version="1.0" encoding="utf-8"?>
+<p:sld xmlns:a="http://schemas.openxmlformats.org/drawingml/2006/main" xmlns:r="http://schemas.openxmlformats.org/officeDocument/2006/relationships" xmlns:p="http://schemas.openxmlformats.org/presentationml/2006/main">
+  <p:cSld>
+    <p:spTree>
+      <p:nvGrpSpPr>
+        <p:cNvPr id="1" name=""/>
+        <p:cNvGrpSpPr/>
+        <p:nvPr/>
+      </p:nvGrpSpPr>
+      <p:grpSpPr>
+        <a:xfrm>
+          <a:off x="0" y="0"/>
+          <a:ext cx="0" cy="0"/>
+          <a:chOff x="0" y="0"/>
+          <a:chExt cx="0" cy="0"/>
+        </a:xfrm>
+      </p:grpSpPr>
+      <p:sp>
+        <p:nvSpPr>
+          <p:cNvPr id="4" name="Text Placeholder 2">
+            <a:extLst>
+              <a:ext uri="{FF2B5EF4-FFF2-40B4-BE49-F238E27FC236}">
+                <a16:creationId xmlns:a16="http://schemas.microsoft.com/office/drawing/2014/main" id="{0A48BF52-5FE0-4078-AEC7-3BA4144BF70A}"/>
+              </a:ext>
+            </a:extLst>
+          </p:cNvPr>
+          <p:cNvSpPr txBox="1">
+            <a:spLocks/>
+          </p:cNvSpPr>
+          <p:nvPr/>
+        </p:nvSpPr>
+        <p:spPr>
+          <a:xfrm>
+            <a:off x="1531343" y="1752600"/>
+            <a:ext cx="9144000" cy="1506537"/>
+          </a:xfrm>
+          <a:prstGeom prst="rect">
+            <a:avLst/>
+          </a:prstGeom>
+        </p:spPr>
+        <p:txBody>
+          <a:bodyPr/>
+          <a:lstStyle>
+            <a:lvl1pPr marL="228600" indent="-228600" algn="l" defTabSz="914400" rtl="0" eaLnBrk="1" latinLnBrk="0" hangingPunct="1">
+              <a:lnSpc>
+                <a:spcPct val="90000"/>
+              </a:lnSpc>
+              <a:spcBef>
+                <a:spcPts val="1800"/>
+              </a:spcBef>
+              <a:buClr>
+                <a:schemeClr val="accent1"/>
+              </a:buClr>
+              <a:buFont typeface="Arial" pitchFamily="34" charset="0"/>
+              <a:buChar char="•"/>
+              <a:defRPr sz="2000" kern="1200">
+                <a:solidFill>
+                  <a:schemeClr val="tx1">
+                    <a:lumMod val="85000"/>
+                  </a:schemeClr>
+                </a:solidFill>
+                <a:latin typeface="+mn-lt"/>
+                <a:ea typeface="+mn-ea"/>
+                <a:cs typeface="+mn-cs"/>
+              </a:defRPr>
+            </a:lvl1pPr>
+            <a:lvl2pPr marL="594360" indent="-228600" algn="l" defTabSz="914400" rtl="0" eaLnBrk="1" latinLnBrk="0" hangingPunct="1">
+              <a:lnSpc>
+                <a:spcPct val="90000"/>
+              </a:lnSpc>
+              <a:spcBef>
+                <a:spcPts val="1000"/>
+              </a:spcBef>
+              <a:buClr>
+                <a:schemeClr val="accent1"/>
+              </a:buClr>
+              <a:buFont typeface="Arial" pitchFamily="34" charset="0"/>
+              <a:buChar char="•"/>
+              <a:defRPr sz="1800" kern="1200">
+                <a:solidFill>
+                  <a:schemeClr val="tx1">
+                    <a:lumMod val="85000"/>
+                  </a:schemeClr>
+                </a:solidFill>
+                <a:latin typeface="+mn-lt"/>
+                <a:ea typeface="+mn-ea"/>
+                <a:cs typeface="+mn-cs"/>
+              </a:defRPr>
+            </a:lvl2pPr>
+            <a:lvl3pPr marL="914400" indent="-228600" algn="l" defTabSz="914400" rtl="0" eaLnBrk="1" latinLnBrk="0" hangingPunct="1">
+              <a:lnSpc>
+                <a:spcPct val="90000"/>
+              </a:lnSpc>
+              <a:spcBef>
+                <a:spcPts val="800"/>
+              </a:spcBef>
+              <a:buClr>
+                <a:schemeClr val="accent1"/>
+              </a:buClr>
+              <a:buFont typeface="Arial" pitchFamily="34" charset="0"/>
+              <a:buChar char="•"/>
+              <a:defRPr sz="1600" kern="1200">
+                <a:solidFill>
+                  <a:schemeClr val="tx1">
+                    <a:lumMod val="85000"/>
+                  </a:schemeClr>
+                </a:solidFill>
+                <a:latin typeface="+mn-lt"/>
+                <a:ea typeface="+mn-ea"/>
+                <a:cs typeface="+mn-cs"/>
+              </a:defRPr>
+            </a:lvl3pPr>
+            <a:lvl4pPr marL="1234440" indent="-228600" algn="l" defTabSz="914400" rtl="0" eaLnBrk="1" latinLnBrk="0" hangingPunct="1">
+              <a:lnSpc>
+                <a:spcPct val="90000"/>
+              </a:lnSpc>
+              <a:spcBef>
+                <a:spcPts val="800"/>
+              </a:spcBef>
+              <a:buClr>
+                <a:schemeClr val="accent1"/>
+              </a:buClr>
+              <a:buFont typeface="Arial" pitchFamily="34" charset="0"/>
+              <a:buChar char="•"/>
+              <a:defRPr sz="1400" kern="1200">
+                <a:solidFill>
+                  <a:schemeClr val="tx1">
+                    <a:lumMod val="85000"/>
+                  </a:schemeClr>
+                </a:solidFill>
+                <a:latin typeface="+mn-lt"/>
+                <a:ea typeface="+mn-ea"/>
+                <a:cs typeface="+mn-cs"/>
+              </a:defRPr>
+            </a:lvl4pPr>
+            <a:lvl5pPr marL="1508760" indent="-228600" algn="l" defTabSz="914400" rtl="0" eaLnBrk="1" latinLnBrk="0" hangingPunct="1">
+              <a:lnSpc>
+                <a:spcPct val="90000"/>
+              </a:lnSpc>
+              <a:spcBef>
+                <a:spcPts val="800"/>
+              </a:spcBef>
+              <a:buClr>
+                <a:schemeClr val="accent1"/>
+              </a:buClr>
+              <a:buFont typeface="Arial" pitchFamily="34" charset="0"/>
+              <a:buChar char="•"/>
+              <a:defRPr sz="1400" kern="1200">
+                <a:solidFill>
+                  <a:schemeClr val="tx1">
+                    <a:lumMod val="85000"/>
+                  </a:schemeClr>
+                </a:solidFill>
+                <a:latin typeface="+mn-lt"/>
+                <a:ea typeface="+mn-ea"/>
+                <a:cs typeface="+mn-cs"/>
+              </a:defRPr>
+            </a:lvl5pPr>
+            <a:lvl6pPr marL="1783080" indent="-228600" algn="l" defTabSz="914400" rtl="0" eaLnBrk="1" latinLnBrk="0" hangingPunct="1">
+              <a:lnSpc>
+                <a:spcPct val="90000"/>
+              </a:lnSpc>
+              <a:spcBef>
+                <a:spcPts val="800"/>
+              </a:spcBef>
+              <a:buClr>
+                <a:schemeClr val="accent1"/>
+              </a:buClr>
+              <a:buFont typeface="Arial" pitchFamily="34" charset="0"/>
+              <a:buChar char="•"/>
+              <a:defRPr sz="1400" kern="1200">
+                <a:solidFill>
+                  <a:schemeClr val="tx1"/>
+                </a:solidFill>
+                <a:latin typeface="+mn-lt"/>
+                <a:ea typeface="+mn-ea"/>
+                <a:cs typeface="+mn-cs"/>
+              </a:defRPr>
+            </a:lvl6pPr>
+            <a:lvl7pPr marL="2057400" indent="-228600" algn="l" defTabSz="914400" rtl="0" eaLnBrk="1" latinLnBrk="0" hangingPunct="1">
+              <a:lnSpc>
+                <a:spcPct val="90000"/>
+              </a:lnSpc>
+              <a:spcBef>
+                <a:spcPts val="800"/>
+              </a:spcBef>
+              <a:buClr>
+                <a:schemeClr val="accent1"/>
+              </a:buClr>
+              <a:buFont typeface="Arial" pitchFamily="34" charset="0"/>
+              <a:buChar char="•"/>
+              <a:defRPr sz="1400" kern="1200">
+                <a:solidFill>
+                  <a:schemeClr val="tx1"/>
+                </a:solidFill>
+                <a:latin typeface="+mn-lt"/>
+                <a:ea typeface="+mn-ea"/>
+                <a:cs typeface="+mn-cs"/>
+              </a:defRPr>
+            </a:lvl7pPr>
+            <a:lvl8pPr marL="2331720" indent="-228600" algn="l" defTabSz="914400" rtl="0" eaLnBrk="1" latinLnBrk="0" hangingPunct="1">
+              <a:lnSpc>
+                <a:spcPct val="90000"/>
+              </a:lnSpc>
+              <a:spcBef>
+                <a:spcPts val="800"/>
+              </a:spcBef>
+              <a:buClr>
+                <a:schemeClr val="accent1"/>
+              </a:buClr>
+              <a:buFont typeface="Arial" pitchFamily="34" charset="0"/>
+              <a:buChar char="•"/>
+              <a:defRPr sz="1400" kern="1200">
+                <a:solidFill>
+                  <a:schemeClr val="tx1"/>
+                </a:solidFill>
+                <a:latin typeface="+mn-lt"/>
+                <a:ea typeface="+mn-ea"/>
+                <a:cs typeface="+mn-cs"/>
+              </a:defRPr>
+            </a:lvl8pPr>
+            <a:lvl9pPr marL="2606040" indent="-228600" algn="l" defTabSz="914400" rtl="0" eaLnBrk="1" latinLnBrk="0" hangingPunct="1">
+              <a:lnSpc>
+                <a:spcPct val="90000"/>
+              </a:lnSpc>
+              <a:spcBef>
+                <a:spcPts val="800"/>
+              </a:spcBef>
+              <a:buClr>
+                <a:schemeClr val="accent1"/>
+              </a:buClr>
+              <a:buFont typeface="Arial" pitchFamily="34" charset="0"/>
+              <a:buChar char="•"/>
+              <a:defRPr sz="1400" kern="1200">
+                <a:solidFill>
+                  <a:schemeClr val="tx1"/>
+                </a:solidFill>
+                <a:latin typeface="+mn-lt"/>
+                <a:ea typeface="+mn-ea"/>
+                <a:cs typeface="+mn-cs"/>
+              </a:defRPr>
+            </a:lvl9pPr>
+          </a:lstStyle>
+          <a:p>
+            <a:pPr marL="0" indent="0">
+              <a:buNone/>
+            </a:pPr>
+            <a:r>
+              <a:rPr lang="en-US" sz="3600" dirty="0">
+                <a:solidFill>
+                  <a:schemeClr val="accent1"/>
+                </a:solidFill>
+              </a:rPr>
+              <a:t>SPA Web Application Authentication &amp; Authorization </a:t>
+            </a:r>
+          </a:p>
+          <a:p>
+            <a:pPr marL="0" indent="0">
+              <a:buNone/>
+            </a:pPr>
+            <a:r>
+              <a:rPr lang="en-US" sz="3600" dirty="0">
+                <a:hlinkClick r:id="rId3"/>
+              </a:rPr>
+              <a:t>https://docs.microsoft.com/en-us/aspnet/core/security/authentication/identity-api-authorization?view=aspnetcore-3.0</a:t>
+            </a:r>
+            <a:endParaRPr lang="en-US" sz="3600" dirty="0">
+              <a:solidFill>
+                <a:schemeClr val="accent1"/>
+              </a:solidFill>
+            </a:endParaRPr>
+          </a:p>
+        </p:txBody>
+      </p:sp>
+      <p:sp>
+        <p:nvSpPr>
+          <p:cNvPr id="5" name="Title 1">
+            <a:extLst>
+              <a:ext uri="{FF2B5EF4-FFF2-40B4-BE49-F238E27FC236}">
+                <a16:creationId xmlns:a16="http://schemas.microsoft.com/office/drawing/2014/main" id="{2E40D7B3-0158-4AE2-A2A5-55BE74CF81D7}"/>
+              </a:ext>
+            </a:extLst>
+          </p:cNvPr>
+          <p:cNvSpPr txBox="1">
+            <a:spLocks/>
+          </p:cNvSpPr>
+          <p:nvPr/>
+        </p:nvSpPr>
+        <p:spPr>
+          <a:xfrm>
+            <a:off x="1527048" y="609600"/>
+            <a:ext cx="9144000" cy="1143000"/>
+          </a:xfrm>
+          <a:prstGeom prst="rect">
+            <a:avLst/>
+          </a:prstGeom>
+        </p:spPr>
+        <p:txBody>
+          <a:bodyPr>
+            <a:normAutofit/>
+          </a:bodyPr>
+          <a:lstStyle>
+            <a:lvl1pPr algn="l" defTabSz="914400" rtl="0" eaLnBrk="1" latinLnBrk="0" hangingPunct="1">
+              <a:lnSpc>
+                <a:spcPct val="90000"/>
+              </a:lnSpc>
+              <a:spcBef>
+                <a:spcPct val="0"/>
+              </a:spcBef>
+              <a:buNone/>
+              <a:defRPr sz="3400" kern="1200">
+                <a:solidFill>
+                  <a:schemeClr val="accent1"/>
+                </a:solidFill>
+                <a:latin typeface="+mj-lt"/>
+                <a:ea typeface="+mj-ea"/>
+                <a:cs typeface="+mj-cs"/>
+              </a:defRPr>
+            </a:lvl1pPr>
+          </a:lstStyle>
+          <a:p>
+            <a:r>
+              <a:rPr lang="en-US" sz="4400" dirty="0"/>
+              <a:t>Helpful links</a:t>
+            </a:r>
+          </a:p>
+        </p:txBody>
+      </p:sp>
+    </p:spTree>
+    <p:extLst>
+      <p:ext uri="{BB962C8B-B14F-4D97-AF65-F5344CB8AC3E}">
+        <p14:creationId xmlns:p14="http://schemas.microsoft.com/office/powerpoint/2010/main" val="620669015"/>
       </p:ext>
     </p:extLst>
   </p:cSld>
@@ -27947,7 +28088,7 @@
 </p:sld>
 </file>
 
-<file path=ppt/slides/slide3.xml><?xml version="1.0" encoding="utf-8"?>
+<file path=ppt/slides/slide24.xml><?xml version="1.0" encoding="utf-8"?>
 <p:sld xmlns:a="http://schemas.openxmlformats.org/drawingml/2006/main" xmlns:r="http://schemas.openxmlformats.org/officeDocument/2006/relationships" xmlns:p="http://schemas.openxmlformats.org/presentationml/2006/main">
   <p:cSld>
     <p:spTree>
@@ -27966,7 +28107,7 @@
       </p:grpSpPr>
       <p:sp>
         <p:nvSpPr>
-          <p:cNvPr id="2" name="Title 1"/>
+          <p:cNvPr id="13" name="Title 12"/>
           <p:cNvSpPr>
             <a:spLocks noGrp="1"/>
           </p:cNvSpPr>
@@ -27976,19 +28117,19 @@
         </p:nvSpPr>
         <p:spPr>
           <a:xfrm>
-            <a:off x="1600200" y="228600"/>
-            <a:ext cx="9144000" cy="1143000"/>
+            <a:off x="1600200" y="838200"/>
+            <a:ext cx="9567530" cy="1143000"/>
           </a:xfrm>
         </p:spPr>
         <p:txBody>
           <a:bodyPr>
-            <a:normAutofit/>
+            <a:noAutofit/>
           </a:bodyPr>
           <a:lstStyle/>
           <a:p>
             <a:r>
               <a:rPr lang="en-US" sz="4400" dirty="0"/>
-              <a:t>What will you learn today?</a:t>
+              <a:t>Where to get this presentation and the resources?</a:t>
             </a:r>
             <a:endParaRPr sz="4400" dirty="0"/>
           </a:p>
@@ -27996,13 +28137,7 @@
       </p:sp>
       <p:sp>
         <p:nvSpPr>
-          <p:cNvPr id="3" name="Content Placeholder 2">
-            <a:extLst>
-              <a:ext uri="{FF2B5EF4-FFF2-40B4-BE49-F238E27FC236}">
-                <a16:creationId xmlns:a16="http://schemas.microsoft.com/office/drawing/2014/main" id="{15175691-DCD4-4687-8530-7083D741AF52}"/>
-              </a:ext>
-            </a:extLst>
-          </p:cNvPr>
+          <p:cNvPr id="14" name="Content Placeholder 13"/>
           <p:cNvSpPr>
             <a:spLocks noGrp="1"/>
           </p:cNvSpPr>
@@ -28012,39 +28147,93 @@
         </p:nvSpPr>
         <p:spPr>
           <a:xfrm>
-            <a:off x="1524000" y="2580167"/>
-            <a:ext cx="9144000" cy="4267200"/>
+            <a:off x="1524000" y="2590800"/>
+            <a:ext cx="9144000" cy="3505200"/>
           </a:xfrm>
         </p:spPr>
         <p:txBody>
           <a:bodyPr>
-            <a:normAutofit/>
+            <a:noAutofit/>
           </a:bodyPr>
           <a:lstStyle/>
           <a:p>
             <a:r>
-              <a:rPr lang="en-US" sz="3200" dirty="0"/>
-              <a:t>The principals of OAuth 2.0 and OpenID Connect protocols.</a:t>
+              <a:rPr lang="en-US" dirty="0">
+                <a:hlinkClick r:id="rId3"/>
+              </a:rPr>
+              <a:t>IdentityServer4 Demos 1 &amp; 2</a:t>
             </a:r>
+            <a:endParaRPr lang="en-US" dirty="0"/>
           </a:p>
           <a:p>
             <a:r>
-              <a:rPr lang="en-US" sz="3200" dirty="0"/>
-              <a:t>How IdentityServer4 can be used to implement the OAuth 2.0 and OpenID Connect protocols to secure your API’s, Web and Mobile applications.</a:t>
+              <a:rPr lang="en-US" dirty="0">
+                <a:hlinkClick r:id="rId4"/>
+              </a:rPr>
+              <a:t>IdentityServer4 Demo 3</a:t>
             </a:r>
+            <a:endParaRPr lang="en-US" dirty="0"/>
           </a:p>
           <a:p>
             <a:r>
-              <a:rPr lang="en-US" sz="3200" dirty="0"/>
-              <a:t>How IdentityServer4 can be used to implement a SSO</a:t>
+              <a:rPr lang="en-US" dirty="0">
+                <a:hlinkClick r:id="rId5"/>
+              </a:rPr>
+              <a:t>OIDC JavaScript client</a:t>
             </a:r>
+            <a:endParaRPr lang="en-US" dirty="0"/>
+          </a:p>
+          <a:p>
+            <a:r>
+              <a:rPr lang="en-US" dirty="0">
+                <a:hlinkClick r:id="rId6"/>
+              </a:rPr>
+              <a:t>OpenID Connect Implementations</a:t>
+            </a:r>
+            <a:endParaRPr dirty="0"/>
+          </a:p>
+          <a:p>
+            <a:r>
+              <a:rPr lang="en-US" dirty="0">
+                <a:hlinkClick r:id="rId7"/>
+              </a:rPr>
+              <a:t>iOS OAuth 2.0 &amp; OpenID Connect example</a:t>
+            </a:r>
+            <a:endParaRPr lang="en-US" dirty="0"/>
+          </a:p>
+          <a:p>
+            <a:r>
+              <a:rPr lang="en-US" dirty="0">
+                <a:hlinkClick r:id="rId8"/>
+              </a:rPr>
+              <a:t>Xamarin example</a:t>
+            </a:r>
+            <a:endParaRPr lang="en-US" dirty="0"/>
+          </a:p>
+          <a:p>
+            <a:r>
+              <a:rPr lang="en-US" dirty="0">
+                <a:hlinkClick r:id="rId9"/>
+              </a:rPr>
+              <a:t>OAuth 2.0 --rfc6749</a:t>
+            </a:r>
+            <a:endParaRPr lang="en-US" dirty="0"/>
+          </a:p>
+          <a:p>
+            <a:r>
+              <a:rPr lang="en-US" dirty="0">
+                <a:hlinkClick r:id="rId10"/>
+              </a:rPr>
+              <a:t>OpenID Connect</a:t>
+            </a:r>
+            <a:endParaRPr dirty="0"/>
           </a:p>
         </p:txBody>
       </p:sp>
     </p:spTree>
     <p:extLst>
       <p:ext uri="{BB962C8B-B14F-4D97-AF65-F5344CB8AC3E}">
-        <p14:creationId xmlns:p14="http://schemas.microsoft.com/office/powerpoint/2010/main" val="2116190161"/>
+        <p14:creationId xmlns:p14="http://schemas.microsoft.com/office/powerpoint/2010/main" val="3042826300"/>
       </p:ext>
     </p:extLst>
   </p:cSld>
@@ -28054,7 +28243,7 @@
 </p:sld>
 </file>
 
-<file path=ppt/slides/slide4.xml><?xml version="1.0" encoding="utf-8"?>
+<file path=ppt/slides/slide3.xml><?xml version="1.0" encoding="utf-8"?>
 <p:sld xmlns:a="http://schemas.openxmlformats.org/drawingml/2006/main" xmlns:r="http://schemas.openxmlformats.org/officeDocument/2006/relationships" xmlns:p="http://schemas.openxmlformats.org/presentationml/2006/main" show="0">
   <p:cSld>
     <p:spTree>
@@ -28152,7 +28341,553 @@
 </p:sld>
 </file>
 
+<file path=ppt/slides/slide4.xml><?xml version="1.0" encoding="utf-8"?>
+<p:sld xmlns:a="http://schemas.openxmlformats.org/drawingml/2006/main" xmlns:r="http://schemas.openxmlformats.org/officeDocument/2006/relationships" xmlns:p="http://schemas.openxmlformats.org/presentationml/2006/main">
+  <p:cSld>
+    <p:spTree>
+      <p:nvGrpSpPr>
+        <p:cNvPr id="1" name=""/>
+        <p:cNvGrpSpPr/>
+        <p:nvPr/>
+      </p:nvGrpSpPr>
+      <p:grpSpPr>
+        <a:xfrm>
+          <a:off x="0" y="0"/>
+          <a:ext cx="0" cy="0"/>
+          <a:chOff x="0" y="0"/>
+          <a:chExt cx="0" cy="0"/>
+        </a:xfrm>
+      </p:grpSpPr>
+      <p:sp>
+        <p:nvSpPr>
+          <p:cNvPr id="2" name="Title 1"/>
+          <p:cNvSpPr>
+            <a:spLocks noGrp="1"/>
+          </p:cNvSpPr>
+          <p:nvPr>
+            <p:ph type="title"/>
+          </p:nvPr>
+        </p:nvSpPr>
+        <p:spPr>
+          <a:xfrm>
+            <a:off x="1527048" y="228600"/>
+            <a:ext cx="9144000" cy="1143000"/>
+          </a:xfrm>
+        </p:spPr>
+        <p:txBody>
+          <a:bodyPr>
+            <a:normAutofit/>
+          </a:bodyPr>
+          <a:lstStyle/>
+          <a:p>
+            <a:r>
+              <a:rPr lang="en-US" sz="4400" dirty="0"/>
+              <a:t>OAuth 2.0 Spec Links</a:t>
+            </a:r>
+            <a:endParaRPr sz="4400" dirty="0"/>
+          </a:p>
+        </p:txBody>
+      </p:sp>
+      <p:sp>
+        <p:nvSpPr>
+          <p:cNvPr id="4" name="Content Placeholder 3"/>
+          <p:cNvSpPr>
+            <a:spLocks noGrp="1"/>
+          </p:cNvSpPr>
+          <p:nvPr>
+            <p:ph sz="half" idx="2"/>
+          </p:nvPr>
+        </p:nvSpPr>
+        <p:spPr>
+          <a:xfrm>
+            <a:off x="1527048" y="2514600"/>
+            <a:ext cx="9979152" cy="4267200"/>
+          </a:xfrm>
+        </p:spPr>
+        <p:txBody>
+          <a:bodyPr>
+            <a:noAutofit/>
+          </a:bodyPr>
+          <a:lstStyle/>
+          <a:p>
+            <a:pPr marL="0" indent="0">
+              <a:buNone/>
+            </a:pPr>
+            <a:r>
+              <a:rPr lang="en-US" b="1" dirty="0"/>
+              <a:t>OAuth 2.0 Core</a:t>
+            </a:r>
+          </a:p>
+          <a:p>
+            <a:r>
+              <a:rPr lang="en-US" dirty="0">
+                <a:hlinkClick r:id="rId3"/>
+              </a:rPr>
+              <a:t>OAuth 2.0 Framework</a:t>
+            </a:r>
+            <a:r>
+              <a:rPr lang="en-US" dirty="0"/>
+              <a:t> — RFC 6749</a:t>
+            </a:r>
+          </a:p>
+          <a:p>
+            <a:r>
+              <a:rPr lang="en-US" dirty="0">
+                <a:hlinkClick r:id="rId4"/>
+              </a:rPr>
+              <a:t>Bearer Token Usage</a:t>
+            </a:r>
+            <a:r>
+              <a:rPr lang="en-US" dirty="0"/>
+              <a:t> — RFC 6750</a:t>
+            </a:r>
+          </a:p>
+          <a:p>
+            <a:r>
+              <a:rPr lang="en-US" dirty="0">
+                <a:hlinkClick r:id="rId5"/>
+              </a:rPr>
+              <a:t>Threat Model and Security Considerations</a:t>
+            </a:r>
+            <a:r>
+              <a:rPr lang="en-US" dirty="0"/>
+              <a:t> — RFC 6819</a:t>
+            </a:r>
+          </a:p>
+          <a:p>
+            <a:pPr marL="0" indent="0">
+              <a:buNone/>
+            </a:pPr>
+            <a:r>
+              <a:rPr lang="en-US" b="1" dirty="0"/>
+              <a:t>OAuth 2.0 Extensions</a:t>
+            </a:r>
+          </a:p>
+          <a:p>
+            <a:r>
+              <a:rPr lang="en-US" dirty="0">
+                <a:hlinkClick r:id="rId6"/>
+              </a:rPr>
+              <a:t>JSON Web Token</a:t>
+            </a:r>
+            <a:r>
+              <a:rPr lang="en-US" dirty="0"/>
+              <a:t> — RFC 7519</a:t>
+            </a:r>
+          </a:p>
+          <a:p>
+            <a:r>
+              <a:rPr lang="en-US" dirty="0">
+                <a:hlinkClick r:id="rId7"/>
+              </a:rPr>
+              <a:t>OAuth Assertions Framework</a:t>
+            </a:r>
+            <a:r>
+              <a:rPr lang="en-US" dirty="0"/>
+              <a:t> — RFC 7521</a:t>
+            </a:r>
+          </a:p>
+          <a:p>
+            <a:r>
+              <a:rPr lang="en-US" dirty="0">
+                <a:hlinkClick r:id="rId8"/>
+              </a:rPr>
+              <a:t>SAML2 Bearer Assertion</a:t>
+            </a:r>
+            <a:r>
+              <a:rPr lang="en-US" dirty="0"/>
+              <a:t> — RFC 7522, for integrating with existing identity systems</a:t>
+            </a:r>
+          </a:p>
+          <a:p>
+            <a:r>
+              <a:rPr lang="en-US" dirty="0">
+                <a:hlinkClick r:id="rId9"/>
+              </a:rPr>
+              <a:t>JWT Bearer Assertion</a:t>
+            </a:r>
+            <a:r>
+              <a:rPr lang="en-US" dirty="0"/>
+              <a:t> — RFC 7523, for integrating with existing identity</a:t>
+            </a:r>
+          </a:p>
+          <a:p>
+            <a:pPr marL="0" indent="0">
+              <a:buNone/>
+            </a:pPr>
+            <a:endParaRPr lang="en-US" dirty="0"/>
+          </a:p>
+          <a:p>
+            <a:endParaRPr dirty="0"/>
+          </a:p>
+        </p:txBody>
+      </p:sp>
+    </p:spTree>
+    <p:extLst>
+      <p:ext uri="{BB962C8B-B14F-4D97-AF65-F5344CB8AC3E}">
+        <p14:creationId xmlns:p14="http://schemas.microsoft.com/office/powerpoint/2010/main" val="1475842300"/>
+      </p:ext>
+    </p:extLst>
+  </p:cSld>
+  <p:clrMapOvr>
+    <a:masterClrMapping/>
+  </p:clrMapOvr>
+</p:sld>
+</file>
+
 <file path=ppt/slides/slide5.xml><?xml version="1.0" encoding="utf-8"?>
+<p:sld xmlns:a="http://schemas.openxmlformats.org/drawingml/2006/main" xmlns:r="http://schemas.openxmlformats.org/officeDocument/2006/relationships" xmlns:p="http://schemas.openxmlformats.org/presentationml/2006/main">
+  <p:cSld>
+    <p:spTree>
+      <p:nvGrpSpPr>
+        <p:cNvPr id="1" name=""/>
+        <p:cNvGrpSpPr/>
+        <p:nvPr/>
+      </p:nvGrpSpPr>
+      <p:grpSpPr>
+        <a:xfrm>
+          <a:off x="0" y="0"/>
+          <a:ext cx="0" cy="0"/>
+          <a:chOff x="0" y="0"/>
+          <a:chExt cx="0" cy="0"/>
+        </a:xfrm>
+      </p:grpSpPr>
+      <p:sp>
+        <p:nvSpPr>
+          <p:cNvPr id="2" name="Title 1">
+            <a:extLst>
+              <a:ext uri="{FF2B5EF4-FFF2-40B4-BE49-F238E27FC236}">
+                <a16:creationId xmlns:a16="http://schemas.microsoft.com/office/drawing/2014/main" id="{528E7B88-B875-46B6-894C-F15F86ACEE9B}"/>
+              </a:ext>
+            </a:extLst>
+          </p:cNvPr>
+          <p:cNvSpPr txBox="1">
+            <a:spLocks/>
+          </p:cNvSpPr>
+          <p:nvPr/>
+        </p:nvSpPr>
+        <p:spPr>
+          <a:xfrm>
+            <a:off x="1514348" y="609600"/>
+            <a:ext cx="9144000" cy="1143000"/>
+          </a:xfrm>
+          <a:prstGeom prst="rect">
+            <a:avLst/>
+          </a:prstGeom>
+        </p:spPr>
+        <p:txBody>
+          <a:bodyPr>
+            <a:normAutofit/>
+          </a:bodyPr>
+          <a:lstStyle>
+            <a:lvl1pPr algn="l" defTabSz="914400" rtl="0" eaLnBrk="1" latinLnBrk="0" hangingPunct="1">
+              <a:lnSpc>
+                <a:spcPct val="90000"/>
+              </a:lnSpc>
+              <a:spcBef>
+                <a:spcPct val="0"/>
+              </a:spcBef>
+              <a:buNone/>
+              <a:defRPr sz="3400" kern="1200">
+                <a:solidFill>
+                  <a:schemeClr val="accent1"/>
+                </a:solidFill>
+                <a:latin typeface="+mj-lt"/>
+                <a:ea typeface="+mj-ea"/>
+                <a:cs typeface="+mj-cs"/>
+              </a:defRPr>
+            </a:lvl1pPr>
+          </a:lstStyle>
+          <a:p>
+            <a:r>
+              <a:rPr lang="en-US" sz="4400" dirty="0"/>
+              <a:t>OpenID Connect Spec Links</a:t>
+            </a:r>
+          </a:p>
+        </p:txBody>
+      </p:sp>
+      <p:sp>
+        <p:nvSpPr>
+          <p:cNvPr id="3" name="Content Placeholder 3">
+            <a:extLst>
+              <a:ext uri="{FF2B5EF4-FFF2-40B4-BE49-F238E27FC236}">
+                <a16:creationId xmlns:a16="http://schemas.microsoft.com/office/drawing/2014/main" id="{E1B43815-5897-4532-920B-396CD518DD7F}"/>
+              </a:ext>
+            </a:extLst>
+          </p:cNvPr>
+          <p:cNvSpPr txBox="1">
+            <a:spLocks/>
+          </p:cNvSpPr>
+          <p:nvPr/>
+        </p:nvSpPr>
+        <p:spPr>
+          <a:xfrm>
+            <a:off x="1527048" y="2514600"/>
+            <a:ext cx="9979152" cy="4267200"/>
+          </a:xfrm>
+          <a:prstGeom prst="rect">
+            <a:avLst/>
+          </a:prstGeom>
+        </p:spPr>
+        <p:txBody>
+          <a:bodyPr>
+            <a:normAutofit/>
+          </a:bodyPr>
+          <a:lstStyle>
+            <a:lvl1pPr marL="228600" indent="-228600" algn="l" defTabSz="914400" rtl="0" eaLnBrk="1" latinLnBrk="0" hangingPunct="1">
+              <a:lnSpc>
+                <a:spcPct val="90000"/>
+              </a:lnSpc>
+              <a:spcBef>
+                <a:spcPts val="1800"/>
+              </a:spcBef>
+              <a:buClr>
+                <a:schemeClr val="accent1"/>
+              </a:buClr>
+              <a:buFont typeface="Arial" pitchFamily="34" charset="0"/>
+              <a:buChar char="•"/>
+              <a:defRPr sz="2000" kern="1200">
+                <a:solidFill>
+                  <a:schemeClr val="tx1">
+                    <a:lumMod val="85000"/>
+                  </a:schemeClr>
+                </a:solidFill>
+                <a:latin typeface="+mn-lt"/>
+                <a:ea typeface="+mn-ea"/>
+                <a:cs typeface="+mn-cs"/>
+              </a:defRPr>
+            </a:lvl1pPr>
+            <a:lvl2pPr marL="594360" indent="-228600" algn="l" defTabSz="914400" rtl="0" eaLnBrk="1" latinLnBrk="0" hangingPunct="1">
+              <a:lnSpc>
+                <a:spcPct val="90000"/>
+              </a:lnSpc>
+              <a:spcBef>
+                <a:spcPts val="1000"/>
+              </a:spcBef>
+              <a:buClr>
+                <a:schemeClr val="accent1"/>
+              </a:buClr>
+              <a:buFont typeface="Arial" pitchFamily="34" charset="0"/>
+              <a:buChar char="•"/>
+              <a:defRPr sz="1800" kern="1200">
+                <a:solidFill>
+                  <a:schemeClr val="tx1">
+                    <a:lumMod val="85000"/>
+                  </a:schemeClr>
+                </a:solidFill>
+                <a:latin typeface="+mn-lt"/>
+                <a:ea typeface="+mn-ea"/>
+                <a:cs typeface="+mn-cs"/>
+              </a:defRPr>
+            </a:lvl2pPr>
+            <a:lvl3pPr marL="914400" indent="-228600" algn="l" defTabSz="914400" rtl="0" eaLnBrk="1" latinLnBrk="0" hangingPunct="1">
+              <a:lnSpc>
+                <a:spcPct val="90000"/>
+              </a:lnSpc>
+              <a:spcBef>
+                <a:spcPts val="800"/>
+              </a:spcBef>
+              <a:buClr>
+                <a:schemeClr val="accent1"/>
+              </a:buClr>
+              <a:buFont typeface="Arial" pitchFamily="34" charset="0"/>
+              <a:buChar char="•"/>
+              <a:defRPr sz="1600" kern="1200">
+                <a:solidFill>
+                  <a:schemeClr val="tx1">
+                    <a:lumMod val="85000"/>
+                  </a:schemeClr>
+                </a:solidFill>
+                <a:latin typeface="+mn-lt"/>
+                <a:ea typeface="+mn-ea"/>
+                <a:cs typeface="+mn-cs"/>
+              </a:defRPr>
+            </a:lvl3pPr>
+            <a:lvl4pPr marL="1234440" indent="-228600" algn="l" defTabSz="914400" rtl="0" eaLnBrk="1" latinLnBrk="0" hangingPunct="1">
+              <a:lnSpc>
+                <a:spcPct val="90000"/>
+              </a:lnSpc>
+              <a:spcBef>
+                <a:spcPts val="800"/>
+              </a:spcBef>
+              <a:buClr>
+                <a:schemeClr val="accent1"/>
+              </a:buClr>
+              <a:buFont typeface="Arial" pitchFamily="34" charset="0"/>
+              <a:buChar char="•"/>
+              <a:defRPr sz="1400" kern="1200">
+                <a:solidFill>
+                  <a:schemeClr val="tx1">
+                    <a:lumMod val="85000"/>
+                  </a:schemeClr>
+                </a:solidFill>
+                <a:latin typeface="+mn-lt"/>
+                <a:ea typeface="+mn-ea"/>
+                <a:cs typeface="+mn-cs"/>
+              </a:defRPr>
+            </a:lvl4pPr>
+            <a:lvl5pPr marL="1508760" indent="-228600" algn="l" defTabSz="914400" rtl="0" eaLnBrk="1" latinLnBrk="0" hangingPunct="1">
+              <a:lnSpc>
+                <a:spcPct val="90000"/>
+              </a:lnSpc>
+              <a:spcBef>
+                <a:spcPts val="800"/>
+              </a:spcBef>
+              <a:buClr>
+                <a:schemeClr val="accent1"/>
+              </a:buClr>
+              <a:buFont typeface="Arial" pitchFamily="34" charset="0"/>
+              <a:buChar char="•"/>
+              <a:defRPr sz="1400" kern="1200">
+                <a:solidFill>
+                  <a:schemeClr val="tx1">
+                    <a:lumMod val="85000"/>
+                  </a:schemeClr>
+                </a:solidFill>
+                <a:latin typeface="+mn-lt"/>
+                <a:ea typeface="+mn-ea"/>
+                <a:cs typeface="+mn-cs"/>
+              </a:defRPr>
+            </a:lvl5pPr>
+            <a:lvl6pPr marL="1783080" indent="-228600" algn="l" defTabSz="914400" rtl="0" eaLnBrk="1" latinLnBrk="0" hangingPunct="1">
+              <a:lnSpc>
+                <a:spcPct val="90000"/>
+              </a:lnSpc>
+              <a:spcBef>
+                <a:spcPts val="800"/>
+              </a:spcBef>
+              <a:buClr>
+                <a:schemeClr val="accent1"/>
+              </a:buClr>
+              <a:buFont typeface="Arial" pitchFamily="34" charset="0"/>
+              <a:buChar char="•"/>
+              <a:defRPr sz="1400" kern="1200">
+                <a:solidFill>
+                  <a:schemeClr val="tx1"/>
+                </a:solidFill>
+                <a:latin typeface="+mn-lt"/>
+                <a:ea typeface="+mn-ea"/>
+                <a:cs typeface="+mn-cs"/>
+              </a:defRPr>
+            </a:lvl6pPr>
+            <a:lvl7pPr marL="2057400" indent="-228600" algn="l" defTabSz="914400" rtl="0" eaLnBrk="1" latinLnBrk="0" hangingPunct="1">
+              <a:lnSpc>
+                <a:spcPct val="90000"/>
+              </a:lnSpc>
+              <a:spcBef>
+                <a:spcPts val="800"/>
+              </a:spcBef>
+              <a:buClr>
+                <a:schemeClr val="accent1"/>
+              </a:buClr>
+              <a:buFont typeface="Arial" pitchFamily="34" charset="0"/>
+              <a:buChar char="•"/>
+              <a:defRPr sz="1400" kern="1200">
+                <a:solidFill>
+                  <a:schemeClr val="tx1"/>
+                </a:solidFill>
+                <a:latin typeface="+mn-lt"/>
+                <a:ea typeface="+mn-ea"/>
+                <a:cs typeface="+mn-cs"/>
+              </a:defRPr>
+            </a:lvl7pPr>
+            <a:lvl8pPr marL="2331720" indent="-228600" algn="l" defTabSz="914400" rtl="0" eaLnBrk="1" latinLnBrk="0" hangingPunct="1">
+              <a:lnSpc>
+                <a:spcPct val="90000"/>
+              </a:lnSpc>
+              <a:spcBef>
+                <a:spcPts val="800"/>
+              </a:spcBef>
+              <a:buClr>
+                <a:schemeClr val="accent1"/>
+              </a:buClr>
+              <a:buFont typeface="Arial" pitchFamily="34" charset="0"/>
+              <a:buChar char="•"/>
+              <a:defRPr sz="1400" kern="1200">
+                <a:solidFill>
+                  <a:schemeClr val="tx1"/>
+                </a:solidFill>
+                <a:latin typeface="+mn-lt"/>
+                <a:ea typeface="+mn-ea"/>
+                <a:cs typeface="+mn-cs"/>
+              </a:defRPr>
+            </a:lvl8pPr>
+            <a:lvl9pPr marL="2606040" indent="-228600" algn="l" defTabSz="914400" rtl="0" eaLnBrk="1" latinLnBrk="0" hangingPunct="1">
+              <a:lnSpc>
+                <a:spcPct val="90000"/>
+              </a:lnSpc>
+              <a:spcBef>
+                <a:spcPts val="800"/>
+              </a:spcBef>
+              <a:buClr>
+                <a:schemeClr val="accent1"/>
+              </a:buClr>
+              <a:buFont typeface="Arial" pitchFamily="34" charset="0"/>
+              <a:buChar char="•"/>
+              <a:defRPr sz="1400" kern="1200">
+                <a:solidFill>
+                  <a:schemeClr val="tx1"/>
+                </a:solidFill>
+                <a:latin typeface="+mn-lt"/>
+                <a:ea typeface="+mn-ea"/>
+                <a:cs typeface="+mn-cs"/>
+              </a:defRPr>
+            </a:lvl9pPr>
+          </a:lstStyle>
+          <a:p>
+            <a:pPr marL="0" indent="0">
+              <a:buFont typeface="Arial" pitchFamily="34" charset="0"/>
+              <a:buNone/>
+            </a:pPr>
+            <a:r>
+              <a:rPr lang="en-US" sz="3200" b="1" dirty="0"/>
+              <a:t>OpenID Connect</a:t>
+            </a:r>
+          </a:p>
+          <a:p>
+            <a:r>
+              <a:rPr lang="en-US" sz="3200" dirty="0">
+                <a:hlinkClick r:id="rId3"/>
+              </a:rPr>
+              <a:t>Core 1.0</a:t>
+            </a:r>
+            <a:endParaRPr lang="en-US" sz="3200" dirty="0"/>
+          </a:p>
+          <a:p>
+            <a:r>
+              <a:rPr lang="en-US" sz="3200" dirty="0">
+                <a:hlinkClick r:id="rId4"/>
+              </a:rPr>
+              <a:t>Discovery</a:t>
+            </a:r>
+            <a:endParaRPr lang="en-US" sz="3200" dirty="0"/>
+          </a:p>
+          <a:p>
+            <a:pPr marL="0" indent="0">
+              <a:buFont typeface="Arial" pitchFamily="34" charset="0"/>
+              <a:buNone/>
+            </a:pPr>
+            <a:endParaRPr lang="en-US" dirty="0"/>
+          </a:p>
+          <a:p>
+            <a:endParaRPr lang="en-US" dirty="0"/>
+          </a:p>
+        </p:txBody>
+      </p:sp>
+    </p:spTree>
+    <p:extLst>
+      <p:ext uri="{BB962C8B-B14F-4D97-AF65-F5344CB8AC3E}">
+        <p14:creationId xmlns:p14="http://schemas.microsoft.com/office/powerpoint/2010/main" val="2231221510"/>
+      </p:ext>
+    </p:extLst>
+  </p:cSld>
+  <p:clrMapOvr>
+    <a:masterClrMapping/>
+  </p:clrMapOvr>
+</p:sld>
+</file>
+
+<file path=ppt/slides/slide6.xml><?xml version="1.0" encoding="utf-8"?>
 <p:sld xmlns:a="http://schemas.openxmlformats.org/drawingml/2006/main" xmlns:r="http://schemas.openxmlformats.org/officeDocument/2006/relationships" xmlns:p="http://schemas.openxmlformats.org/presentationml/2006/main">
   <p:cSld>
     <p:spTree>
@@ -28284,7 +29019,7 @@
 </p:sld>
 </file>
 
-<file path=ppt/slides/slide6.xml><?xml version="1.0" encoding="utf-8"?>
+<file path=ppt/slides/slide7.xml><?xml version="1.0" encoding="utf-8"?>
 <p:sld xmlns:a="http://schemas.openxmlformats.org/drawingml/2006/main" xmlns:r="http://schemas.openxmlformats.org/officeDocument/2006/relationships" xmlns:p="http://schemas.openxmlformats.org/presentationml/2006/main">
   <p:cSld>
     <p:spTree>
@@ -28369,7 +29104,7 @@
 </p:sld>
 </file>
 
-<file path=ppt/slides/slide7.xml><?xml version="1.0" encoding="utf-8"?>
+<file path=ppt/slides/slide8.xml><?xml version="1.0" encoding="utf-8"?>
 <p:sld xmlns:a="http://schemas.openxmlformats.org/drawingml/2006/main" xmlns:r="http://schemas.openxmlformats.org/officeDocument/2006/relationships" xmlns:p="http://schemas.openxmlformats.org/presentationml/2006/main">
   <p:cSld>
     <p:spTree>
@@ -28466,136 +29201,6 @@
 </p:sld>
 </file>
 
-<file path=ppt/slides/slide8.xml><?xml version="1.0" encoding="utf-8"?>
-<p:sld xmlns:a="http://schemas.openxmlformats.org/drawingml/2006/main" xmlns:r="http://schemas.openxmlformats.org/officeDocument/2006/relationships" xmlns:p="http://schemas.openxmlformats.org/presentationml/2006/main">
-  <p:cSld>
-    <p:spTree>
-      <p:nvGrpSpPr>
-        <p:cNvPr id="1" name=""/>
-        <p:cNvGrpSpPr/>
-        <p:nvPr/>
-      </p:nvGrpSpPr>
-      <p:grpSpPr>
-        <a:xfrm>
-          <a:off x="0" y="0"/>
-          <a:ext cx="0" cy="0"/>
-          <a:chOff x="0" y="0"/>
-          <a:chExt cx="0" cy="0"/>
-        </a:xfrm>
-      </p:grpSpPr>
-      <p:sp>
-        <p:nvSpPr>
-          <p:cNvPr id="2" name="Title 1">
-            <a:extLst>
-              <a:ext uri="{FF2B5EF4-FFF2-40B4-BE49-F238E27FC236}">
-                <a16:creationId xmlns:a16="http://schemas.microsoft.com/office/drawing/2014/main" id="{E8A90DBC-5A74-4572-AE01-AFD9F1764132}"/>
-              </a:ext>
-            </a:extLst>
-          </p:cNvPr>
-          <p:cNvSpPr txBox="1">
-            <a:spLocks/>
-          </p:cNvSpPr>
-          <p:nvPr/>
-        </p:nvSpPr>
-        <p:spPr>
-          <a:xfrm>
-            <a:off x="1513608" y="685800"/>
-            <a:ext cx="9459191" cy="1143000"/>
-          </a:xfrm>
-          <a:prstGeom prst="rect">
-            <a:avLst/>
-          </a:prstGeom>
-        </p:spPr>
-        <p:txBody>
-          <a:bodyPr/>
-          <a:lstStyle>
-            <a:lvl1pPr algn="l" defTabSz="914400" rtl="0" eaLnBrk="1" latinLnBrk="0" hangingPunct="1">
-              <a:lnSpc>
-                <a:spcPct val="90000"/>
-              </a:lnSpc>
-              <a:spcBef>
-                <a:spcPct val="0"/>
-              </a:spcBef>
-              <a:buNone/>
-              <a:defRPr sz="3400" kern="1200">
-                <a:solidFill>
-                  <a:schemeClr val="accent1"/>
-                </a:solidFill>
-                <a:latin typeface="+mj-lt"/>
-                <a:ea typeface="+mj-ea"/>
-                <a:cs typeface="+mj-cs"/>
-              </a:defRPr>
-            </a:lvl1pPr>
-          </a:lstStyle>
-          <a:p>
-            <a:r>
-              <a:rPr lang="en-US" sz="4400" dirty="0"/>
-              <a:t>OAuth 2.0</a:t>
-            </a:r>
-            <a:br>
-              <a:rPr lang="en-US" sz="4400" dirty="0"/>
-            </a:br>
-            <a:endParaRPr lang="en-US" sz="4400" dirty="0"/>
-          </a:p>
-        </p:txBody>
-      </p:sp>
-      <p:sp>
-        <p:nvSpPr>
-          <p:cNvPr id="3" name="TextBox 2">
-            <a:extLst>
-              <a:ext uri="{FF2B5EF4-FFF2-40B4-BE49-F238E27FC236}">
-                <a16:creationId xmlns:a16="http://schemas.microsoft.com/office/drawing/2014/main" id="{770FE21A-375C-47FC-B4DE-6FACAA5890A7}"/>
-              </a:ext>
-            </a:extLst>
-          </p:cNvPr>
-          <p:cNvSpPr txBox="1"/>
-          <p:nvPr/>
-        </p:nvSpPr>
-        <p:spPr>
-          <a:xfrm>
-            <a:off x="1513608" y="2362200"/>
-            <a:ext cx="9078191" cy="1938992"/>
-          </a:xfrm>
-          <a:prstGeom prst="rect">
-            <a:avLst/>
-          </a:prstGeom>
-          <a:noFill/>
-        </p:spPr>
-        <p:txBody>
-          <a:bodyPr wrap="square" rtlCol="0">
-            <a:spAutoFit/>
-          </a:bodyPr>
-          <a:lstStyle/>
-          <a:p>
-            <a:r>
-              <a:rPr lang="en-US" sz="4000" dirty="0"/>
-              <a:t>Front Channel (Browser)</a:t>
-            </a:r>
-          </a:p>
-          <a:p>
-            <a:endParaRPr lang="en-US" sz="4000" dirty="0"/>
-          </a:p>
-          <a:p>
-            <a:r>
-              <a:rPr lang="en-US" sz="4000" dirty="0"/>
-              <a:t>Back Channel</a:t>
-            </a:r>
-          </a:p>
-        </p:txBody>
-      </p:sp>
-    </p:spTree>
-    <p:extLst>
-      <p:ext uri="{BB962C8B-B14F-4D97-AF65-F5344CB8AC3E}">
-        <p14:creationId xmlns:p14="http://schemas.microsoft.com/office/powerpoint/2010/main" val="429275877"/>
-      </p:ext>
-    </p:extLst>
-  </p:cSld>
-  <p:clrMapOvr>
-    <a:masterClrMapping/>
-  </p:clrMapOvr>
-</p:sld>
-</file>
-
 <file path=ppt/slides/slide9.xml><?xml version="1.0" encoding="utf-8"?>
 <p:sld xmlns:a="http://schemas.openxmlformats.org/drawingml/2006/main" xmlns:r="http://schemas.openxmlformats.org/officeDocument/2006/relationships" xmlns:p="http://schemas.openxmlformats.org/presentationml/2006/main">
   <p:cSld>
@@ -28660,8 +29265,12 @@
           <a:p>
             <a:r>
               <a:rPr lang="en-US" sz="4400" dirty="0"/>
-              <a:t>OAuth 2.0 Access Tokens</a:t>
+              <a:t>OAuth 2.0 Code Flow</a:t>
             </a:r>
+            <a:br>
+              <a:rPr lang="en-US" sz="4400" dirty="0"/>
+            </a:br>
+            <a:endParaRPr lang="en-US" sz="4400" dirty="0"/>
           </a:p>
         </p:txBody>
       </p:sp>
@@ -28680,7 +29289,7 @@
         <p:spPr>
           <a:xfrm>
             <a:off x="1513608" y="2362200"/>
-            <a:ext cx="9078191" cy="1938992"/>
+            <a:ext cx="9078191" cy="3170099"/>
           </a:xfrm>
           <a:prstGeom prst="rect">
             <a:avLst/>
@@ -28695,7 +29304,13 @@
           <a:p>
             <a:r>
               <a:rPr lang="en-US" sz="4000" dirty="0"/>
-              <a:t>Reference</a:t>
+              <a:t>Front Channel </a:t>
+            </a:r>
+          </a:p>
+          <a:p>
+            <a:r>
+              <a:rPr lang="en-US" sz="4000" dirty="0"/>
+              <a:t>(Browser) </a:t>
             </a:r>
           </a:p>
           <a:p>
@@ -28704,7 +29319,13 @@
           <a:p>
             <a:r>
               <a:rPr lang="en-US" sz="4000" dirty="0"/>
-              <a:t>Self contained - JWT</a:t>
+              <a:t>Back Channel </a:t>
+            </a:r>
+          </a:p>
+          <a:p>
+            <a:r>
+              <a:rPr lang="en-US" sz="4000" dirty="0"/>
+              <a:t>(Web Server to Auth Server)</a:t>
             </a:r>
           </a:p>
         </p:txBody>
@@ -28712,7 +29333,7 @@
     </p:spTree>
     <p:extLst>
       <p:ext uri="{BB962C8B-B14F-4D97-AF65-F5344CB8AC3E}">
-        <p14:creationId xmlns:p14="http://schemas.microsoft.com/office/powerpoint/2010/main" val="2057785949"/>
+        <p14:creationId xmlns:p14="http://schemas.microsoft.com/office/powerpoint/2010/main" val="429275877"/>
       </p:ext>
     </p:extLst>
   </p:cSld>
@@ -29506,15 +30127,6 @@
 </file>
 
 <file path=customXml/item1.xml><?xml version="1.0" encoding="utf-8"?>
-<?mso-contentType ?>
-<FormTemplates xmlns="http://schemas.microsoft.com/sharepoint/v3/contenttype/forms">
-  <Display>DocumentLibraryForm</Display>
-  <Edit>AssetEditForm</Edit>
-  <New>DocumentLibraryForm</New>
-</FormTemplates>
-</file>
-
-<file path=customXml/item2.xml><?xml version="1.0" encoding="utf-8"?>
 <ct:contentTypeSchema xmlns:ct="http://schemas.microsoft.com/office/2006/metadata/contentType" xmlns:ma="http://schemas.microsoft.com/office/2006/metadata/properties/metaAttributes" ct:_="" ma:_="" ma:contentTypeName="TemplateFile" ma:contentTypeID="0x0101006EDDDB5EE6D98C44930B742096920B300400F5B6D36B3EF94B4E9A635CDF2A18F5B8" ma:contentTypeVersion="72" ma:contentTypeDescription="Create a new document." ma:contentTypeScope="" ma:versionID="a23e56308344d904b51738559c3d67c9">
   <xsd:schema xmlns:xsd="http://www.w3.org/2001/XMLSchema" xmlns:xs="http://www.w3.org/2001/XMLSchema" xmlns:p="http://schemas.microsoft.com/office/2006/metadata/properties" xmlns:ns2="4873beb7-5857-4685-be1f-d57550cc96cc" targetNamespace="http://schemas.microsoft.com/office/2006/metadata/properties" ma:root="true" ma:fieldsID="cd0908cc4600e77bf5da051303e00c8d" ns2:_="">
     <xsd:import namespace="4873beb7-5857-4685-be1f-d57550cc96cc"/>
@@ -30554,6 +31166,15 @@
 </ct:contentTypeSchema>
 </file>
 
+<file path=customXml/item2.xml><?xml version="1.0" encoding="utf-8"?>
+<?mso-contentType ?>
+<FormTemplates xmlns="http://schemas.microsoft.com/sharepoint/v3/contenttype/forms">
+  <Display>DocumentLibraryForm</Display>
+  <Edit>AssetEditForm</Edit>
+  <New>DocumentLibraryForm</New>
+</FormTemplates>
+</file>
+
 <file path=customXml/item3.xml><?xml version="1.0" encoding="utf-8"?>
 <p:properties xmlns:p="http://schemas.microsoft.com/office/2006/metadata/properties" xmlns:xsi="http://www.w3.org/2001/XMLSchema-instance" xmlns:pc="http://schemas.microsoft.com/office/infopath/2007/PartnerControls">
   <documentManagement>
@@ -30681,14 +31302,6 @@
 </file>
 
 <file path=customXml/itemProps1.xml><?xml version="1.0" encoding="utf-8"?>
-<ds:datastoreItem xmlns:ds="http://schemas.openxmlformats.org/officeDocument/2006/customXml" ds:itemID="{746CFF6F-D9AA-4BC0-911A-0A1356771912}">
-  <ds:schemaRefs>
-    <ds:schemaRef ds:uri="http://schemas.microsoft.com/sharepoint/v3/contenttype/forms"/>
-  </ds:schemaRefs>
-</ds:datastoreItem>
-</file>
-
-<file path=customXml/itemProps2.xml><?xml version="1.0" encoding="utf-8"?>
 <ds:datastoreItem xmlns:ds="http://schemas.openxmlformats.org/officeDocument/2006/customXml" ds:itemID="{0B5C6E15-39DC-470B-9445-F754B9458020}">
   <ds:schemaRefs>
     <ds:schemaRef ds:uri="http://schemas.microsoft.com/office/2006/metadata/contentType"/>
@@ -30702,6 +31315,14 @@
     <ds:schemaRef ds:uri="http://purl.org/dc/elements/1.1/"/>
     <ds:schemaRef ds:uri="http://purl.org/dc/terms/"/>
     <ds:schemaRef ds:uri="http://schemas.microsoft.com/internal/obd"/>
+  </ds:schemaRefs>
+</ds:datastoreItem>
+</file>
+
+<file path=customXml/itemProps2.xml><?xml version="1.0" encoding="utf-8"?>
+<ds:datastoreItem xmlns:ds="http://schemas.openxmlformats.org/officeDocument/2006/customXml" ds:itemID="{746CFF6F-D9AA-4BC0-911A-0A1356771912}">
+  <ds:schemaRefs>
+    <ds:schemaRef ds:uri="http://schemas.microsoft.com/sharepoint/v3/contenttype/forms"/>
   </ds:schemaRefs>
 </ds:datastoreItem>
 </file>

</xml_diff>